<commit_message>
included the tag slide
</commit_message>
<xml_diff>
--- a/Git-V 0.1.pptx
+++ b/Git-V 0.1.pptx
@@ -5,7 +5,7 @@
     <p:sldMasterId id="2147483648" r:id="rId1"/>
   </p:sldMasterIdLst>
   <p:notesMasterIdLst>
-    <p:notesMasterId r:id="rId32"/>
+    <p:notesMasterId r:id="rId33"/>
   </p:notesMasterIdLst>
   <p:sldIdLst>
     <p:sldId id="266" r:id="rId2"/>
@@ -26,18 +26,19 @@
     <p:sldId id="274" r:id="rId17"/>
     <p:sldId id="275" r:id="rId18"/>
     <p:sldId id="277" r:id="rId19"/>
-    <p:sldId id="280" r:id="rId20"/>
-    <p:sldId id="281" r:id="rId21"/>
-    <p:sldId id="286" r:id="rId22"/>
-    <p:sldId id="287" r:id="rId23"/>
-    <p:sldId id="288" r:id="rId24"/>
-    <p:sldId id="276" r:id="rId25"/>
-    <p:sldId id="282" r:id="rId26"/>
-    <p:sldId id="278" r:id="rId27"/>
-    <p:sldId id="284" r:id="rId28"/>
-    <p:sldId id="285" r:id="rId29"/>
-    <p:sldId id="283" r:id="rId30"/>
-    <p:sldId id="263" r:id="rId31"/>
+    <p:sldId id="292" r:id="rId20"/>
+    <p:sldId id="280" r:id="rId21"/>
+    <p:sldId id="281" r:id="rId22"/>
+    <p:sldId id="286" r:id="rId23"/>
+    <p:sldId id="287" r:id="rId24"/>
+    <p:sldId id="288" r:id="rId25"/>
+    <p:sldId id="276" r:id="rId26"/>
+    <p:sldId id="282" r:id="rId27"/>
+    <p:sldId id="278" r:id="rId28"/>
+    <p:sldId id="284" r:id="rId29"/>
+    <p:sldId id="285" r:id="rId30"/>
+    <p:sldId id="283" r:id="rId31"/>
+    <p:sldId id="263" r:id="rId32"/>
   </p:sldIdLst>
   <p:sldSz cx="12192000" cy="6858000"/>
   <p:notesSz cx="6858000" cy="9144000"/>
@@ -144,6 +145,18 @@
 </p:presentation>
 </file>
 
+<file path=ppt/commentAuthors.xml><?xml version="1.0" encoding="utf-8"?>
+<p:cmAuthorLst xmlns:a="http://schemas.openxmlformats.org/drawingml/2006/main" xmlns:r="http://schemas.openxmlformats.org/officeDocument/2006/relationships" xmlns:p="http://schemas.openxmlformats.org/presentationml/2006/main">
+  <p:cmAuthor id="1" name="Vishal Titre" initials="VT" lastIdx="4" clrIdx="0">
+    <p:extLst>
+      <p:ext uri="{19B8F6BF-5375-455C-9EA6-DF929625EA0E}">
+        <p15:presenceInfo xmlns:p15="http://schemas.microsoft.com/office/powerpoint/2012/main" userId="Vishal Titre" providerId="None"/>
+      </p:ext>
+    </p:extLst>
+  </p:cmAuthor>
+</p:cmAuthorLst>
+</file>
+
 <file path=ppt/notesMasters/notesMaster1.xml><?xml version="1.0" encoding="utf-8"?>
 <p:notesMaster xmlns:a="http://schemas.openxmlformats.org/drawingml/2006/main" xmlns:r="http://schemas.openxmlformats.org/officeDocument/2006/relationships" xmlns:p="http://schemas.openxmlformats.org/presentationml/2006/main">
   <p:cSld>
@@ -226,7 +239,7 @@
           <a:p>
             <a:fld id="{535BD93C-9BC5-4D6C-96E2-3CE6E739DC63}" type="datetimeFigureOut">
               <a:rPr lang="en-US" smtClean="0"/>
-              <a:t>8/17/2016</a:t>
+              <a:t>8/18/2016</a:t>
             </a:fld>
             <a:endParaRPr lang="en-US" dirty="0"/>
           </a:p>
@@ -709,7 +722,7 @@
           <a:p>
             <a:fld id="{6CD0446F-E209-4116-AC7C-FD2952455805}" type="datetimeFigureOut">
               <a:rPr lang="en-US" smtClean="0"/>
-              <a:t>8/17/2016</a:t>
+              <a:t>8/18/2016</a:t>
             </a:fld>
             <a:endParaRPr lang="en-US" dirty="0"/>
           </a:p>
@@ -880,7 +893,7 @@
           <a:p>
             <a:fld id="{6CD0446F-E209-4116-AC7C-FD2952455805}" type="datetimeFigureOut">
               <a:rPr lang="en-US" smtClean="0"/>
-              <a:t>8/17/2016</a:t>
+              <a:t>8/18/2016</a:t>
             </a:fld>
             <a:endParaRPr lang="en-US" dirty="0"/>
           </a:p>
@@ -1061,7 +1074,7 @@
           <a:p>
             <a:fld id="{6CD0446F-E209-4116-AC7C-FD2952455805}" type="datetimeFigureOut">
               <a:rPr lang="en-US" smtClean="0"/>
-              <a:t>8/17/2016</a:t>
+              <a:t>8/18/2016</a:t>
             </a:fld>
             <a:endParaRPr lang="en-US" dirty="0"/>
           </a:p>
@@ -1232,7 +1245,7 @@
           <a:p>
             <a:fld id="{6CD0446F-E209-4116-AC7C-FD2952455805}" type="datetimeFigureOut">
               <a:rPr lang="en-US" smtClean="0"/>
-              <a:t>8/17/2016</a:t>
+              <a:t>8/18/2016</a:t>
             </a:fld>
             <a:endParaRPr lang="en-US" dirty="0"/>
           </a:p>
@@ -1479,7 +1492,7 @@
           <a:p>
             <a:fld id="{6CD0446F-E209-4116-AC7C-FD2952455805}" type="datetimeFigureOut">
               <a:rPr lang="en-US" smtClean="0"/>
-              <a:t>8/17/2016</a:t>
+              <a:t>8/18/2016</a:t>
             </a:fld>
             <a:endParaRPr lang="en-US" dirty="0"/>
           </a:p>
@@ -1712,7 +1725,7 @@
           <a:p>
             <a:fld id="{6CD0446F-E209-4116-AC7C-FD2952455805}" type="datetimeFigureOut">
               <a:rPr lang="en-US" smtClean="0"/>
-              <a:t>8/17/2016</a:t>
+              <a:t>8/18/2016</a:t>
             </a:fld>
             <a:endParaRPr lang="en-US" dirty="0"/>
           </a:p>
@@ -2080,7 +2093,7 @@
           <a:p>
             <a:fld id="{6CD0446F-E209-4116-AC7C-FD2952455805}" type="datetimeFigureOut">
               <a:rPr lang="en-US" smtClean="0"/>
-              <a:t>8/17/2016</a:t>
+              <a:t>8/18/2016</a:t>
             </a:fld>
             <a:endParaRPr lang="en-US" dirty="0"/>
           </a:p>
@@ -2199,7 +2212,7 @@
           <a:p>
             <a:fld id="{6CD0446F-E209-4116-AC7C-FD2952455805}" type="datetimeFigureOut">
               <a:rPr lang="en-US" smtClean="0"/>
-              <a:t>8/17/2016</a:t>
+              <a:t>8/18/2016</a:t>
             </a:fld>
             <a:endParaRPr lang="en-US" dirty="0"/>
           </a:p>
@@ -2295,7 +2308,7 @@
           <a:p>
             <a:fld id="{6CD0446F-E209-4116-AC7C-FD2952455805}" type="datetimeFigureOut">
               <a:rPr lang="en-US" smtClean="0"/>
-              <a:t>8/17/2016</a:t>
+              <a:t>8/18/2016</a:t>
             </a:fld>
             <a:endParaRPr lang="en-US" dirty="0"/>
           </a:p>
@@ -2573,7 +2586,7 @@
           <a:p>
             <a:fld id="{6CD0446F-E209-4116-AC7C-FD2952455805}" type="datetimeFigureOut">
               <a:rPr lang="en-US" smtClean="0"/>
-              <a:t>8/17/2016</a:t>
+              <a:t>8/18/2016</a:t>
             </a:fld>
             <a:endParaRPr lang="en-US" dirty="0"/>
           </a:p>
@@ -2827,7 +2840,7 @@
           <a:p>
             <a:fld id="{6CD0446F-E209-4116-AC7C-FD2952455805}" type="datetimeFigureOut">
               <a:rPr lang="en-US" smtClean="0"/>
-              <a:t>8/17/2016</a:t>
+              <a:t>8/18/2016</a:t>
             </a:fld>
             <a:endParaRPr lang="en-US" dirty="0"/>
           </a:p>
@@ -3041,7 +3054,7 @@
           <a:p>
             <a:fld id="{6CD0446F-E209-4116-AC7C-FD2952455805}" type="datetimeFigureOut">
               <a:rPr lang="en-US" smtClean="0"/>
-              <a:t>8/17/2016</a:t>
+              <a:t>8/18/2016</a:t>
             </a:fld>
             <a:endParaRPr lang="en-US" dirty="0"/>
           </a:p>
@@ -3539,13 +3552,8 @@
             <a:p>
               <a:r>
                 <a:rPr lang="en-US" sz="2000" b="1" i="1" dirty="0" smtClean="0"/>
-                <a:t>Prepared by : Vishal </a:t>
+                <a:t>Prepared by : Vishal Titre</a:t>
               </a:r>
-              <a:r>
-                <a:rPr lang="en-US" sz="2000" b="1" i="1" dirty="0" smtClean="0"/>
-                <a:t>Titre</a:t>
-              </a:r>
-              <a:endParaRPr lang="en-US" sz="2000" b="1" i="1" dirty="0" smtClean="0"/>
             </a:p>
           </p:txBody>
         </p:sp>
@@ -4182,8 +4190,8 @@
         </p:nvSpPr>
         <p:spPr>
           <a:xfrm>
-            <a:off x="547436" y="778213"/>
-            <a:ext cx="11244813" cy="3139321"/>
+            <a:off x="547436" y="702797"/>
+            <a:ext cx="11244813" cy="4070345"/>
           </a:xfrm>
           <a:prstGeom prst="rect">
             <a:avLst/>
@@ -4482,6 +4490,131 @@
               <a:t>$ git config –list 					# to see all the configuration details.</a:t>
             </a:r>
           </a:p>
+          <a:p>
+            <a:pPr>
+              <a:lnSpc>
+                <a:spcPct val="150000"/>
+              </a:lnSpc>
+            </a:pPr>
+            <a:endParaRPr lang="en-US" sz="1100" i="1" dirty="0" smtClean="0">
+              <a:latin typeface="Courier New" panose="02070309020205020404" pitchFamily="49" charset="0"/>
+              <a:cs typeface="Courier New" panose="02070309020205020404" pitchFamily="49" charset="0"/>
+            </a:endParaRPr>
+          </a:p>
+          <a:p>
+            <a:pPr marL="171450" indent="-171450">
+              <a:buFont typeface="Wingdings" panose="05000000000000000000" pitchFamily="2" charset="2"/>
+              <a:buChar char="v"/>
+            </a:pPr>
+            <a:r>
+              <a:rPr lang="en-US" altLang="en-US" sz="1100" i="1" dirty="0"/>
+              <a:t>If you want to use a different name/email address for a particular project, you can change it for just that project</a:t>
+            </a:r>
+          </a:p>
+          <a:p>
+            <a:pPr lvl="1"/>
+            <a:r>
+              <a:rPr lang="en-US" altLang="en-US" sz="1100" i="1" dirty="0"/>
+              <a:t>cd to the project </a:t>
+            </a:r>
+            <a:r>
+              <a:rPr lang="en-US" altLang="en-US" sz="1100" i="1" dirty="0" smtClean="0"/>
+              <a:t>directory . Use </a:t>
+            </a:r>
+            <a:r>
+              <a:rPr lang="en-US" altLang="en-US" sz="1100" i="1" dirty="0"/>
+              <a:t>the </a:t>
+            </a:r>
+            <a:r>
+              <a:rPr lang="en-US" altLang="en-US" sz="1100" i="1" dirty="0" smtClean="0"/>
+              <a:t>below commands</a:t>
+            </a:r>
+            <a:r>
+              <a:rPr lang="en-US" altLang="en-US" sz="1100" i="1" dirty="0"/>
+              <a:t>, but leave out the </a:t>
+            </a:r>
+            <a:r>
+              <a:rPr lang="en-US" altLang="en-US" sz="1100" i="1" dirty="0" smtClean="0"/>
+              <a:t>–global.</a:t>
+            </a:r>
+          </a:p>
+          <a:p>
+            <a:pPr lvl="1"/>
+            <a:r>
+              <a:rPr lang="en-US" sz="1100" i="1" dirty="0" smtClean="0">
+                <a:latin typeface="Courier New" panose="02070309020205020404" pitchFamily="49" charset="0"/>
+                <a:cs typeface="Courier New" panose="02070309020205020404" pitchFamily="49" charset="0"/>
+              </a:rPr>
+              <a:t>$ git </a:t>
+            </a:r>
+            <a:r>
+              <a:rPr lang="en-US" sz="1100" i="1" dirty="0">
+                <a:latin typeface="Courier New" panose="02070309020205020404" pitchFamily="49" charset="0"/>
+                <a:cs typeface="Courier New" panose="02070309020205020404" pitchFamily="49" charset="0"/>
+              </a:rPr>
+              <a:t>config </a:t>
+            </a:r>
+            <a:r>
+              <a:rPr lang="en-US" sz="1100" i="1" dirty="0" smtClean="0">
+                <a:latin typeface="Courier New" panose="02070309020205020404" pitchFamily="49" charset="0"/>
+                <a:cs typeface="Courier New" panose="02070309020205020404" pitchFamily="49" charset="0"/>
+              </a:rPr>
+              <a:t>user.name </a:t>
+            </a:r>
+            <a:r>
+              <a:rPr lang="en-US" sz="1100" i="1" dirty="0">
+                <a:latin typeface="Courier New" panose="02070309020205020404" pitchFamily="49" charset="0"/>
+                <a:cs typeface="Courier New" panose="02070309020205020404" pitchFamily="49" charset="0"/>
+              </a:rPr>
+              <a:t>"Your </a:t>
+            </a:r>
+            <a:r>
+              <a:rPr lang="en-US" sz="1100" i="1" dirty="0" smtClean="0">
+                <a:latin typeface="Courier New" panose="02070309020205020404" pitchFamily="49" charset="0"/>
+                <a:cs typeface="Courier New" panose="02070309020205020404" pitchFamily="49" charset="0"/>
+              </a:rPr>
+              <a:t>Name“</a:t>
+            </a:r>
+          </a:p>
+          <a:p>
+            <a:pPr lvl="1"/>
+            <a:r>
+              <a:rPr lang="en-US" sz="1100" i="1" dirty="0" smtClean="0">
+                <a:latin typeface="Courier New" panose="02070309020205020404" pitchFamily="49" charset="0"/>
+                <a:cs typeface="Courier New" panose="02070309020205020404" pitchFamily="49" charset="0"/>
+              </a:rPr>
+              <a:t>$ git </a:t>
+            </a:r>
+            <a:r>
+              <a:rPr lang="en-US" sz="1100" i="1" dirty="0">
+                <a:latin typeface="Courier New" panose="02070309020205020404" pitchFamily="49" charset="0"/>
+                <a:cs typeface="Courier New" panose="02070309020205020404" pitchFamily="49" charset="0"/>
+              </a:rPr>
+              <a:t>config </a:t>
+            </a:r>
+            <a:r>
+              <a:rPr lang="en-US" sz="1100" i="1" dirty="0" smtClean="0">
+                <a:latin typeface="Courier New" panose="02070309020205020404" pitchFamily="49" charset="0"/>
+                <a:cs typeface="Courier New" panose="02070309020205020404" pitchFamily="49" charset="0"/>
+              </a:rPr>
+              <a:t>user.email </a:t>
+            </a:r>
+            <a:r>
+              <a:rPr lang="en-US" sz="1100" i="1" dirty="0">
+                <a:latin typeface="Courier New" panose="02070309020205020404" pitchFamily="49" charset="0"/>
+                <a:cs typeface="Courier New" panose="02070309020205020404" pitchFamily="49" charset="0"/>
+              </a:rPr>
+              <a:t>"youremail@domain.com</a:t>
+            </a:r>
+            <a:r>
+              <a:rPr lang="en-US" sz="1100" i="1" dirty="0" smtClean="0">
+                <a:latin typeface="Courier New" panose="02070309020205020404" pitchFamily="49" charset="0"/>
+                <a:cs typeface="Courier New" panose="02070309020205020404" pitchFamily="49" charset="0"/>
+              </a:rPr>
+              <a:t>"</a:t>
+            </a:r>
+            <a:endParaRPr lang="en-US" altLang="en-US" sz="1100" i="1" dirty="0"/>
+          </a:p>
         </p:txBody>
       </p:sp>
       <p:sp>
@@ -4492,7 +4625,7 @@
         </p:nvSpPr>
         <p:spPr>
           <a:xfrm>
-            <a:off x="547436" y="4216146"/>
+            <a:off x="528582" y="4932579"/>
             <a:ext cx="11244813" cy="400110"/>
           </a:xfrm>
           <a:prstGeom prst="rect">
@@ -4546,7 +4679,7 @@
         </p:nvCxnSpPr>
         <p:spPr>
           <a:xfrm>
-            <a:off x="673572" y="4690103"/>
+            <a:off x="527718" y="5399990"/>
             <a:ext cx="10931894" cy="7071"/>
           </a:xfrm>
           <a:prstGeom prst="line">
@@ -4576,8 +4709,8 @@
         </p:nvSpPr>
         <p:spPr>
           <a:xfrm>
-            <a:off x="358217" y="4868617"/>
-            <a:ext cx="11324702" cy="1107996"/>
+            <a:off x="560134" y="5470358"/>
+            <a:ext cx="11212576" cy="1107996"/>
           </a:xfrm>
           <a:prstGeom prst="rect">
             <a:avLst/>
@@ -4905,7 +5038,7 @@
               <a:lstStyle/>
               <a:p>
                 <a:pPr algn="ctr"/>
-                <a:endParaRPr lang="en-US"/>
+                <a:endParaRPr lang="en-US" dirty="0"/>
               </a:p>
             </p:txBody>
           </p:sp>
@@ -5088,7 +5221,7 @@
             <a:lstStyle/>
             <a:p>
               <a:pPr algn="ctr"/>
-              <a:endParaRPr lang="en-US"/>
+              <a:endParaRPr lang="en-US" dirty="0"/>
             </a:p>
           </p:txBody>
         </p:sp>
@@ -5160,23 +5293,7 @@
                   </a:outerShdw>
                 </a:effectLst>
               </a:rPr>
-              <a:t>    Git </a:t>
-            </a:r>
-            <a:r>
-              <a:rPr lang="en-US" sz="2000" i="1" dirty="0" smtClean="0">
-                <a:ln w="0"/>
-                <a:solidFill>
-                  <a:schemeClr val="accent1"/>
-                </a:solidFill>
-                <a:effectLst>
-                  <a:outerShdw blurRad="38100" dist="25400" dir="5400000" algn="ctr" rotWithShape="0">
-                    <a:srgbClr val="6E747A">
-                      <a:alpha val="43000"/>
-                    </a:srgbClr>
-                  </a:outerShdw>
-                </a:effectLst>
-              </a:rPr>
-              <a:t>Tools</a:t>
+              <a:t>    Git Tools</a:t>
             </a:r>
             <a:endParaRPr lang="en-US" sz="2000" i="1" dirty="0">
               <a:ln w="0"/>
@@ -5240,7 +5357,7 @@
           <a:lstStyle/>
           <a:p>
             <a:r>
-              <a:rPr lang="en-US" smtClean="0"/>
+              <a:rPr lang="en-US" dirty="0" smtClean="0"/>
               <a:t>PUBLIC</a:t>
             </a:r>
             <a:endParaRPr lang="en-US" dirty="0"/>
@@ -5417,7 +5534,7 @@
           <p:nvPr>
             <p:extLst>
               <p:ext uri="{D42A27DB-BD31-4B8C-83A1-F6EECF244321}">
-                <p14:modId xmlns:p14="http://schemas.microsoft.com/office/powerpoint/2010/main" val="513089959"/>
+                <p14:modId xmlns:p14="http://schemas.microsoft.com/office/powerpoint/2010/main" val="1715860780"/>
               </p:ext>
             </p:extLst>
           </p:nvPr>
@@ -5928,7 +6045,55 @@
                           <a:ea typeface="+mn-ea"/>
                           <a:cs typeface="+mn-cs"/>
                         </a:rPr>
-                        <a:t>GIT Branching &amp; Stashing</a:t>
+                        <a:t>GIT </a:t>
+                      </a:r>
+                      <a:r>
+                        <a:rPr lang="en-US" sz="1200" b="0" i="1" u="none" strike="noStrike" kern="1200" dirty="0" smtClean="0">
+                          <a:solidFill>
+                            <a:srgbClr val="000000"/>
+                          </a:solidFill>
+                          <a:effectLst/>
+                          <a:latin typeface="+mn-lt"/>
+                          <a:ea typeface="+mn-ea"/>
+                          <a:cs typeface="+mn-cs"/>
+                        </a:rPr>
+                        <a:t>Branching,</a:t>
+                      </a:r>
+                      <a:r>
+                        <a:rPr lang="en-US" sz="1200" b="0" i="1" u="none" strike="noStrike" kern="1200" baseline="0" dirty="0" smtClean="0">
+                          <a:solidFill>
+                            <a:srgbClr val="000000"/>
+                          </a:solidFill>
+                          <a:effectLst/>
+                          <a:latin typeface="+mn-lt"/>
+                          <a:ea typeface="+mn-ea"/>
+                          <a:cs typeface="+mn-cs"/>
+                        </a:rPr>
+                        <a:t> Merging &amp; </a:t>
+                      </a:r>
+                      <a:r>
+                        <a:rPr lang="en-US" sz="1200" b="0" i="1" u="none" strike="noStrike" kern="1200" dirty="0" smtClean="0">
+                          <a:solidFill>
+                            <a:srgbClr val="000000"/>
+                          </a:solidFill>
+                          <a:effectLst/>
+                          <a:latin typeface="+mn-lt"/>
+                          <a:ea typeface="+mn-ea"/>
+                          <a:cs typeface="+mn-cs"/>
+                        </a:rPr>
+                        <a:t> </a:t>
+                      </a:r>
+                      <a:r>
+                        <a:rPr lang="en-US" sz="1200" b="0" i="1" u="none" strike="noStrike" kern="1200" dirty="0" smtClean="0">
+                          <a:solidFill>
+                            <a:srgbClr val="000000"/>
+                          </a:solidFill>
+                          <a:effectLst/>
+                          <a:latin typeface="+mn-lt"/>
+                          <a:ea typeface="+mn-ea"/>
+                          <a:cs typeface="+mn-cs"/>
+                        </a:rPr>
+                        <a:t>Stashing</a:t>
                       </a:r>
                       <a:endParaRPr lang="en-US" sz="1200" b="0" i="1" u="none" strike="noStrike" kern="1200" dirty="0">
                         <a:solidFill>
@@ -6008,8 +6173,29 @@
                           <a:ea typeface="+mn-ea"/>
                           <a:cs typeface="+mn-cs"/>
                         </a:rPr>
-                        <a:t>GIT Merging</a:t>
+                        <a:t>GIT </a:t>
                       </a:r>
+                      <a:r>
+                        <a:rPr lang="en-US" sz="1200" b="0" i="1" u="none" strike="noStrike" kern="1200" dirty="0" smtClean="0">
+                          <a:solidFill>
+                            <a:srgbClr val="000000"/>
+                          </a:solidFill>
+                          <a:effectLst/>
+                          <a:latin typeface="+mn-lt"/>
+                          <a:ea typeface="+mn-ea"/>
+                          <a:cs typeface="+mn-cs"/>
+                        </a:rPr>
+                        <a:t>tag </a:t>
+                      </a:r>
+                      <a:endParaRPr lang="en-US" sz="1200" b="0" i="1" u="none" strike="noStrike" kern="1200" dirty="0" smtClean="0">
+                        <a:solidFill>
+                          <a:srgbClr val="000000"/>
+                        </a:solidFill>
+                        <a:effectLst/>
+                        <a:latin typeface="+mn-lt"/>
+                        <a:ea typeface="+mn-ea"/>
+                        <a:cs typeface="+mn-cs"/>
+                      </a:endParaRPr>
                     </a:p>
                   </a:txBody>
                   <a:tcPr marL="9525" marR="9525" marT="9525" marB="0" anchor="ctr"/>
@@ -7444,7 +7630,7 @@
                 <a:spcPct val="150000"/>
               </a:lnSpc>
               <a:buFont typeface="Wingdings" panose="05000000000000000000" pitchFamily="2" charset="2"/>
-              <a:buChar char="Ø"/>
+              <a:buChar char="v"/>
             </a:pPr>
             <a:r>
               <a:rPr lang="en-US" sz="1100" i="1" dirty="0" smtClean="0">
@@ -7547,7 +7733,7 @@
                 <a:spcPct val="150000"/>
               </a:lnSpc>
               <a:buFont typeface="Wingdings" panose="05000000000000000000" pitchFamily="2" charset="2"/>
-              <a:buChar char="Ø"/>
+              <a:buChar char="v"/>
             </a:pPr>
             <a:r>
               <a:rPr lang="en-US" sz="1100" i="1" dirty="0" smtClean="0">
@@ -8021,7 +8207,7 @@
                 <a:spcPct val="150000"/>
               </a:lnSpc>
               <a:buFont typeface="Wingdings" panose="05000000000000000000" pitchFamily="2" charset="2"/>
-              <a:buChar char="Ø"/>
+              <a:buChar char="v"/>
             </a:pPr>
             <a:r>
               <a:rPr lang="en-US" sz="1100" i="1" dirty="0" smtClean="0">
@@ -8175,7 +8361,7 @@
                 <a:spcPct val="150000"/>
               </a:lnSpc>
               <a:buFont typeface="Wingdings" panose="05000000000000000000" pitchFamily="2" charset="2"/>
-              <a:buChar char="Ø"/>
+              <a:buChar char="v"/>
             </a:pPr>
             <a:r>
               <a:rPr lang="en-US" sz="1100" i="1" dirty="0" smtClean="0">
@@ -8305,7 +8491,7 @@
                 <a:spcPct val="150000"/>
               </a:lnSpc>
               <a:buFont typeface="Wingdings" panose="05000000000000000000" pitchFamily="2" charset="2"/>
-              <a:buChar char="Ø"/>
+              <a:buChar char="v"/>
             </a:pPr>
             <a:r>
               <a:rPr lang="en-US" sz="1100" i="1" dirty="0">
@@ -8398,7 +8584,7 @@
                 <a:spcPct val="150000"/>
               </a:lnSpc>
               <a:buFont typeface="Wingdings" panose="05000000000000000000" pitchFamily="2" charset="2"/>
-              <a:buChar char="Ø"/>
+              <a:buChar char="v"/>
             </a:pPr>
             <a:r>
               <a:rPr lang="en-US" sz="1100" i="1" dirty="0">
@@ -8786,7 +8972,7 @@
                 <a:spcPct val="150000"/>
               </a:lnSpc>
               <a:buFont typeface="Wingdings" panose="05000000000000000000" pitchFamily="2" charset="2"/>
-              <a:buChar char="Ø"/>
+              <a:buChar char="v"/>
             </a:pPr>
             <a:r>
               <a:rPr lang="en-US" sz="1100" i="1" dirty="0" smtClean="0">
@@ -8904,7 +9090,7 @@
                 <a:spcPct val="150000"/>
               </a:lnSpc>
               <a:buFont typeface="Wingdings" panose="05000000000000000000" pitchFamily="2" charset="2"/>
-              <a:buChar char="Ø"/>
+              <a:buChar char="v"/>
             </a:pPr>
             <a:r>
               <a:rPr lang="en-US" sz="1100" i="1" dirty="0" smtClean="0">
@@ -8944,7 +9130,7 @@
                 <a:spcPct val="150000"/>
               </a:lnSpc>
               <a:buFont typeface="Wingdings" panose="05000000000000000000" pitchFamily="2" charset="2"/>
-              <a:buChar char="Ø"/>
+              <a:buChar char="v"/>
             </a:pPr>
             <a:r>
               <a:rPr lang="en-US" sz="1100" i="1" dirty="0" smtClean="0">
@@ -9048,7 +9234,7 @@
                 <a:spcPct val="150000"/>
               </a:lnSpc>
               <a:buFont typeface="Wingdings" panose="05000000000000000000" pitchFamily="2" charset="2"/>
-              <a:buChar char="Ø"/>
+              <a:buChar char="v"/>
             </a:pPr>
             <a:r>
               <a:rPr lang="en-US" sz="1100" i="1" dirty="0" smtClean="0">
@@ -9289,7 +9475,7 @@
         <p:spPr>
           <a:xfrm>
             <a:off x="474783" y="671586"/>
-            <a:ext cx="11477721" cy="6001643"/>
+            <a:ext cx="11477721" cy="5770811"/>
           </a:xfrm>
           <a:prstGeom prst="rect">
             <a:avLst/>
@@ -9301,6 +9487,19 @@
           </a:bodyPr>
           <a:lstStyle/>
           <a:p>
+            <a:pPr>
+              <a:lnSpc>
+                <a:spcPct val="150000"/>
+              </a:lnSpc>
+            </a:pPr>
+            <a:r>
+              <a:rPr lang="en-US" sz="1200" b="1" i="1" dirty="0" smtClean="0">
+                <a:latin typeface="+mj-lt"/>
+              </a:rPr>
+              <a:t>GIT Branching</a:t>
+            </a:r>
+          </a:p>
+          <a:p>
             <a:pPr marL="171450" indent="-171450">
               <a:lnSpc>
                 <a:spcPct val="150000"/>
@@ -9309,10 +9508,16 @@
               <a:buChar char="v"/>
             </a:pPr>
             <a:r>
+              <a:rPr lang="en-US" sz="1100" i="1" dirty="0" smtClean="0">
+                <a:latin typeface="+mj-lt"/>
+              </a:rPr>
+              <a:t>When </a:t>
+            </a:r>
+            <a:r>
               <a:rPr lang="en-US" sz="1100" i="1" dirty="0">
                 <a:latin typeface="+mj-lt"/>
               </a:rPr>
-              <a:t>When you first create a git repository (with a command such as </a:t>
+              <a:t>you first create a git repository (with a command such as </a:t>
             </a:r>
             <a:r>
               <a:rPr lang="en-US" sz="1100" b="1" i="1" dirty="0">
@@ -9387,47 +9592,228 @@
               <a:buChar char="v"/>
             </a:pPr>
             <a:r>
+              <a:rPr lang="en-US" sz="1100" i="1" u="sng" dirty="0" smtClean="0">
+                <a:latin typeface="+mj-lt"/>
+              </a:rPr>
+              <a:t>HEAD</a:t>
+            </a:r>
+            <a:r>
               <a:rPr lang="en-US" sz="1100" i="1" dirty="0" smtClean="0">
-                <a:effectLst/>
-                <a:latin typeface="+mj-lt"/>
-              </a:rPr>
-              <a:t>Using Git branch command list all the branches </a:t>
+                <a:latin typeface="+mj-lt"/>
+              </a:rPr>
+              <a:t> </a:t>
+            </a:r>
+            <a:r>
+              <a:rPr lang="en-US" sz="1100" i="1" dirty="0">
+                <a:latin typeface="+mj-lt"/>
+              </a:rPr>
+              <a:t>is used by git to refer to the current commit </a:t>
             </a:r>
             <a:r>
               <a:rPr lang="en-US" sz="1100" i="1" dirty="0" smtClean="0">
                 <a:latin typeface="+mj-lt"/>
               </a:rPr>
-              <a:t>in the </a:t>
+              <a:t>you are </a:t>
             </a:r>
             <a:r>
               <a:rPr lang="en-US" sz="1100" i="1" dirty="0">
                 <a:latin typeface="+mj-lt"/>
               </a:rPr>
-              <a:t>repository . The asterisk  that is  placed to the left of branch name is git branch command output indicates the current branch in the </a:t>
+              <a:t>working </a:t>
             </a:r>
             <a:r>
               <a:rPr lang="en-US" sz="1100" i="1" dirty="0" smtClean="0">
                 <a:latin typeface="+mj-lt"/>
               </a:rPr>
-              <a:t>repository.</a:t>
-            </a:r>
-            <a:r>
-              <a:rPr lang="en-US" sz="1100" i="1" dirty="0">
-                <a:latin typeface="+mj-lt"/>
-              </a:rPr>
-              <a:t/>
-            </a:r>
-            <a:br>
-              <a:rPr lang="en-US" sz="1100" i="1" dirty="0">
-                <a:latin typeface="+mj-lt"/>
-              </a:rPr>
-            </a:br>
+              <a:t>on. HEAD config file (.git/HEAD).</a:t>
+            </a:r>
+          </a:p>
+          <a:p>
+            <a:pPr>
+              <a:lnSpc>
+                <a:spcPct val="150000"/>
+              </a:lnSpc>
+            </a:pPr>
             <a:r>
               <a:rPr lang="en-US" sz="1100" i="1" dirty="0" smtClean="0">
                 <a:latin typeface="Courier New" panose="02070309020205020404" pitchFamily="49" charset="0"/>
                 <a:cs typeface="Courier New" panose="02070309020205020404" pitchFamily="49" charset="0"/>
               </a:rPr>
-              <a:t>$ git branch. </a:t>
+              <a:t>$ </a:t>
+            </a:r>
+            <a:r>
+              <a:rPr lang="en-US" sz="1100" i="1" dirty="0">
+                <a:latin typeface="Courier New" panose="02070309020205020404" pitchFamily="49" charset="0"/>
+                <a:cs typeface="Courier New" panose="02070309020205020404" pitchFamily="49" charset="0"/>
+              </a:rPr>
+              <a:t>git branch &lt;new </a:t>
+            </a:r>
+            <a:r>
+              <a:rPr lang="en-US" sz="1100" i="1" dirty="0" smtClean="0">
+                <a:latin typeface="Courier New" panose="02070309020205020404" pitchFamily="49" charset="0"/>
+                <a:cs typeface="Courier New" panose="02070309020205020404" pitchFamily="49" charset="0"/>
+              </a:rPr>
+              <a:t>branch name&gt;	</a:t>
+            </a:r>
+            <a:r>
+              <a:rPr lang="en-US" sz="1100" i="1" dirty="0"/>
+              <a:t> </a:t>
+            </a:r>
+            <a:r>
+              <a:rPr lang="en-US" sz="1100" i="1" dirty="0" smtClean="0"/>
+              <a:t>	</a:t>
+            </a:r>
+            <a:r>
+              <a:rPr lang="en-US" sz="1100" i="1" dirty="0" smtClean="0">
+                <a:latin typeface="Courier New" panose="02070309020205020404" pitchFamily="49" charset="0"/>
+                <a:cs typeface="Courier New" panose="02070309020205020404" pitchFamily="49" charset="0"/>
+              </a:rPr>
+              <a:t># </a:t>
+            </a:r>
+            <a:r>
+              <a:rPr lang="en-US" sz="1100" i="1" dirty="0">
+                <a:latin typeface="Courier New" panose="02070309020205020404" pitchFamily="49" charset="0"/>
+                <a:cs typeface="Courier New" panose="02070309020205020404" pitchFamily="49" charset="0"/>
+              </a:rPr>
+              <a:t>Use below command to create new </a:t>
+            </a:r>
+            <a:r>
+              <a:rPr lang="en-US" sz="1100" i="1" dirty="0" smtClean="0">
+                <a:latin typeface="Courier New" panose="02070309020205020404" pitchFamily="49" charset="0"/>
+                <a:cs typeface="Courier New" panose="02070309020205020404" pitchFamily="49" charset="0"/>
+              </a:rPr>
+              <a:t>Branch.</a:t>
+            </a:r>
+          </a:p>
+          <a:p>
+            <a:pPr>
+              <a:lnSpc>
+                <a:spcPct val="150000"/>
+              </a:lnSpc>
+            </a:pPr>
+            <a:r>
+              <a:rPr lang="en-US" sz="1100" i="1" dirty="0" smtClean="0">
+                <a:latin typeface="Courier New" panose="02070309020205020404" pitchFamily="49" charset="0"/>
+                <a:cs typeface="Courier New" panose="02070309020205020404" pitchFamily="49" charset="0"/>
+              </a:rPr>
+              <a:t>$ git branch			# List all branches in the repository, current branch is indicated by *</a:t>
+            </a:r>
+          </a:p>
+          <a:p>
+            <a:pPr>
+              <a:lnSpc>
+                <a:spcPct val="150000"/>
+              </a:lnSpc>
+            </a:pPr>
+            <a:r>
+              <a:rPr lang="en-US" sz="1100" i="1" dirty="0" smtClean="0">
+                <a:latin typeface="Courier New" panose="02070309020205020404" pitchFamily="49" charset="0"/>
+                <a:cs typeface="Courier New" panose="02070309020205020404" pitchFamily="49" charset="0"/>
+              </a:rPr>
+              <a:t>$ git checkout &lt;branch name&gt;		# Switch to new branch.  </a:t>
+            </a:r>
+          </a:p>
+          <a:p>
+            <a:pPr>
+              <a:lnSpc>
+                <a:spcPct val="150000"/>
+              </a:lnSpc>
+            </a:pPr>
+            <a:r>
+              <a:rPr lang="en-US" sz="1100" i="1" dirty="0" smtClean="0">
+                <a:latin typeface="Courier New" panose="02070309020205020404" pitchFamily="49" charset="0"/>
+                <a:cs typeface="Courier New" panose="02070309020205020404" pitchFamily="49" charset="0"/>
+              </a:rPr>
+              <a:t>$ git ls-files 			# Display all files on current branch.</a:t>
+            </a:r>
+          </a:p>
+          <a:p>
+            <a:pPr>
+              <a:lnSpc>
+                <a:spcPct val="150000"/>
+              </a:lnSpc>
+            </a:pPr>
+            <a:r>
+              <a:rPr lang="en-US" sz="1100" i="1" dirty="0" smtClean="0">
+                <a:latin typeface="Courier New" panose="02070309020205020404" pitchFamily="49" charset="0"/>
+                <a:cs typeface="Courier New" panose="02070309020205020404" pitchFamily="49" charset="0"/>
+              </a:rPr>
+              <a:t>$ git branch –d &lt;branch name&gt;		# Delete the branch.</a:t>
+            </a:r>
+          </a:p>
+          <a:p>
+            <a:pPr>
+              <a:lnSpc>
+                <a:spcPct val="150000"/>
+              </a:lnSpc>
+            </a:pPr>
+            <a:r>
+              <a:rPr lang="en-US" sz="1100" i="1" dirty="0" smtClean="0">
+                <a:latin typeface="Courier New" panose="02070309020205020404" pitchFamily="49" charset="0"/>
+                <a:cs typeface="Courier New" panose="02070309020205020404" pitchFamily="49" charset="0"/>
+              </a:rPr>
+              <a:t>$ git checkout –m &lt;branch name&gt;		# Tells </a:t>
+            </a:r>
+            <a:r>
+              <a:rPr lang="en-US" sz="1100" i="1" dirty="0">
+                <a:latin typeface="Courier New" panose="02070309020205020404" pitchFamily="49" charset="0"/>
+                <a:cs typeface="Courier New" panose="02070309020205020404" pitchFamily="49" charset="0"/>
+              </a:rPr>
+              <a:t>git to merge in any conflicts, before switching </a:t>
+            </a:r>
+            <a:r>
+              <a:rPr lang="en-US" sz="1100" i="1" dirty="0" smtClean="0">
+                <a:latin typeface="Courier New" panose="02070309020205020404" pitchFamily="49" charset="0"/>
+                <a:cs typeface="Courier New" panose="02070309020205020404" pitchFamily="49" charset="0"/>
+              </a:rPr>
+              <a:t>branches.</a:t>
+            </a:r>
+          </a:p>
+          <a:p>
+            <a:pPr>
+              <a:lnSpc>
+                <a:spcPct val="150000"/>
+              </a:lnSpc>
+            </a:pPr>
+            <a:r>
+              <a:rPr lang="en-US" sz="1100" i="1" dirty="0" smtClean="0">
+                <a:latin typeface="Courier New" panose="02070309020205020404" pitchFamily="49" charset="0"/>
+                <a:cs typeface="Courier New" panose="02070309020205020404" pitchFamily="49" charset="0"/>
+              </a:rPr>
+              <a:t>$ git show-branch 			# Shows the branches and the commit history.</a:t>
+            </a:r>
+          </a:p>
+          <a:p>
+            <a:pPr>
+              <a:lnSpc>
+                <a:spcPct val="150000"/>
+              </a:lnSpc>
+            </a:pPr>
+            <a:r>
+              <a:rPr lang="en-US" sz="1100" i="1" dirty="0" smtClean="0">
+                <a:latin typeface="Courier New" panose="02070309020205020404" pitchFamily="49" charset="0"/>
+                <a:cs typeface="Courier New" panose="02070309020205020404" pitchFamily="49" charset="0"/>
+              </a:rPr>
+              <a:t>$ git merge &lt;branch name&gt;		# to merge the branch to into current branch</a:t>
+            </a:r>
+            <a:endParaRPr lang="en-US" sz="1100" i="1" dirty="0">
+              <a:latin typeface="Courier New" panose="02070309020205020404" pitchFamily="49" charset="0"/>
+              <a:cs typeface="Courier New" panose="02070309020205020404" pitchFamily="49" charset="0"/>
+            </a:endParaRPr>
+          </a:p>
+          <a:p>
+            <a:pPr>
+              <a:lnSpc>
+                <a:spcPct val="150000"/>
+              </a:lnSpc>
+            </a:pPr>
+            <a:r>
+              <a:rPr lang="en-US" sz="1400" b="1" i="1" dirty="0"/>
+              <a:t>Stashing your </a:t>
+            </a:r>
+            <a:r>
+              <a:rPr lang="en-US" sz="1400" b="1" i="1" dirty="0" smtClean="0"/>
+              <a:t>work:</a:t>
             </a:r>
           </a:p>
           <a:p>
@@ -9439,216 +9825,22 @@
               <a:buChar char="v"/>
             </a:pPr>
             <a:r>
+              <a:rPr lang="en-US" sz="1100" i="1" dirty="0" smtClean="0">
+                <a:latin typeface="+mj-lt"/>
+              </a:rPr>
+              <a:t>If you are in situation that you </a:t>
+            </a:r>
+            <a:r>
               <a:rPr lang="en-US" sz="1100" i="1" dirty="0">
                 <a:latin typeface="+mj-lt"/>
               </a:rPr>
-              <a:t>HEAD is used by git to refer to the current commit </a:t>
+              <a:t>modifying files in the working directory and/or index and you find out you need to fix a bug on a different branch. You can’t just switch to a different branch and lose all your work</a:t>
             </a:r>
             <a:r>
               <a:rPr lang="en-US" sz="1100" i="1" dirty="0" smtClean="0">
                 <a:latin typeface="+mj-lt"/>
               </a:rPr>
-              <a:t>you are </a:t>
-            </a:r>
-            <a:r>
-              <a:rPr lang="en-US" sz="1100" i="1" dirty="0">
-                <a:latin typeface="+mj-lt"/>
-              </a:rPr>
-              <a:t>working </a:t>
-            </a:r>
-            <a:r>
-              <a:rPr lang="en-US" sz="1100" i="1" dirty="0" smtClean="0">
-                <a:latin typeface="+mj-lt"/>
-              </a:rPr>
-              <a:t>on. HEAD config file (.git/HEAD).</a:t>
-            </a:r>
-          </a:p>
-          <a:p>
-            <a:pPr>
-              <a:lnSpc>
-                <a:spcPct val="150000"/>
-              </a:lnSpc>
-            </a:pPr>
-            <a:r>
-              <a:rPr lang="en-US" sz="1100" i="1" dirty="0" smtClean="0">
-                <a:latin typeface="Courier New" panose="02070309020205020404" pitchFamily="49" charset="0"/>
-                <a:cs typeface="Courier New" panose="02070309020205020404" pitchFamily="49" charset="0"/>
-              </a:rPr>
-              <a:t>$ </a:t>
-            </a:r>
-            <a:r>
-              <a:rPr lang="en-US" sz="1100" i="1" dirty="0">
-                <a:latin typeface="Courier New" panose="02070309020205020404" pitchFamily="49" charset="0"/>
-                <a:cs typeface="Courier New" panose="02070309020205020404" pitchFamily="49" charset="0"/>
-              </a:rPr>
-              <a:t>git branch &lt;new </a:t>
-            </a:r>
-            <a:r>
-              <a:rPr lang="en-US" sz="1100" i="1" dirty="0" smtClean="0">
-                <a:latin typeface="Courier New" panose="02070309020205020404" pitchFamily="49" charset="0"/>
-                <a:cs typeface="Courier New" panose="02070309020205020404" pitchFamily="49" charset="0"/>
-              </a:rPr>
-              <a:t>branch name&gt;	</a:t>
-            </a:r>
-            <a:r>
-              <a:rPr lang="en-US" sz="1100" i="1" dirty="0"/>
-              <a:t> </a:t>
-            </a:r>
-            <a:r>
-              <a:rPr lang="en-US" sz="1100" i="1" dirty="0" smtClean="0"/>
-              <a:t>	</a:t>
-            </a:r>
-            <a:r>
-              <a:rPr lang="en-US" sz="1100" i="1" dirty="0" smtClean="0">
-                <a:latin typeface="Courier New" panose="02070309020205020404" pitchFamily="49" charset="0"/>
-                <a:cs typeface="Courier New" panose="02070309020205020404" pitchFamily="49" charset="0"/>
-              </a:rPr>
-              <a:t># </a:t>
-            </a:r>
-            <a:r>
-              <a:rPr lang="en-US" sz="1100" i="1" dirty="0">
-                <a:latin typeface="Courier New" panose="02070309020205020404" pitchFamily="49" charset="0"/>
-                <a:cs typeface="Courier New" panose="02070309020205020404" pitchFamily="49" charset="0"/>
-              </a:rPr>
-              <a:t>Use below command to create new </a:t>
-            </a:r>
-            <a:r>
-              <a:rPr lang="en-US" sz="1100" i="1" dirty="0" smtClean="0">
-                <a:latin typeface="Courier New" panose="02070309020205020404" pitchFamily="49" charset="0"/>
-                <a:cs typeface="Courier New" panose="02070309020205020404" pitchFamily="49" charset="0"/>
-              </a:rPr>
-              <a:t>Branch.</a:t>
-            </a:r>
-          </a:p>
-          <a:p>
-            <a:pPr>
-              <a:lnSpc>
-                <a:spcPct val="150000"/>
-              </a:lnSpc>
-            </a:pPr>
-            <a:r>
-              <a:rPr lang="en-US" sz="1100" i="1" dirty="0" smtClean="0">
-                <a:latin typeface="Courier New" panose="02070309020205020404" pitchFamily="49" charset="0"/>
-                <a:cs typeface="Courier New" panose="02070309020205020404" pitchFamily="49" charset="0"/>
-              </a:rPr>
-              <a:t>$ git branch			# List all branches in the repository, current branch is indicated by *</a:t>
-            </a:r>
-          </a:p>
-          <a:p>
-            <a:pPr>
-              <a:lnSpc>
-                <a:spcPct val="150000"/>
-              </a:lnSpc>
-            </a:pPr>
-            <a:r>
-              <a:rPr lang="en-US" sz="1100" i="1" dirty="0" smtClean="0">
-                <a:latin typeface="Courier New" panose="02070309020205020404" pitchFamily="49" charset="0"/>
-                <a:cs typeface="Courier New" panose="02070309020205020404" pitchFamily="49" charset="0"/>
-              </a:rPr>
-              <a:t>$ git checkout &lt;branch name&gt;		# Switch to new branch.  </a:t>
-            </a:r>
-          </a:p>
-          <a:p>
-            <a:pPr>
-              <a:lnSpc>
-                <a:spcPct val="150000"/>
-              </a:lnSpc>
-            </a:pPr>
-            <a:r>
-              <a:rPr lang="en-US" sz="1100" i="1" dirty="0" smtClean="0">
-                <a:latin typeface="Courier New" panose="02070309020205020404" pitchFamily="49" charset="0"/>
-                <a:cs typeface="Courier New" panose="02070309020205020404" pitchFamily="49" charset="0"/>
-              </a:rPr>
-              <a:t>$ git ls-files 			# Display all files on current branch.</a:t>
-            </a:r>
-          </a:p>
-          <a:p>
-            <a:pPr>
-              <a:lnSpc>
-                <a:spcPct val="150000"/>
-              </a:lnSpc>
-            </a:pPr>
-            <a:r>
-              <a:rPr lang="en-US" sz="1100" i="1" dirty="0" smtClean="0">
-                <a:latin typeface="Courier New" panose="02070309020205020404" pitchFamily="49" charset="0"/>
-                <a:cs typeface="Courier New" panose="02070309020205020404" pitchFamily="49" charset="0"/>
-              </a:rPr>
-              <a:t>$ git branch –d &lt;branch name&gt;		# Delete the branch.</a:t>
-            </a:r>
-          </a:p>
-          <a:p>
-            <a:pPr>
-              <a:lnSpc>
-                <a:spcPct val="150000"/>
-              </a:lnSpc>
-            </a:pPr>
-            <a:r>
-              <a:rPr lang="en-US" sz="1100" i="1" dirty="0" smtClean="0">
-                <a:latin typeface="Courier New" panose="02070309020205020404" pitchFamily="49" charset="0"/>
-                <a:cs typeface="Courier New" panose="02070309020205020404" pitchFamily="49" charset="0"/>
-              </a:rPr>
-              <a:t>$ git checkout –m &lt;branch name&gt;		# Tells </a:t>
-            </a:r>
-            <a:r>
-              <a:rPr lang="en-US" sz="1100" i="1" dirty="0">
-                <a:latin typeface="Courier New" panose="02070309020205020404" pitchFamily="49" charset="0"/>
-                <a:cs typeface="Courier New" panose="02070309020205020404" pitchFamily="49" charset="0"/>
-              </a:rPr>
-              <a:t>git to merge in any conflicts, before switching </a:t>
-            </a:r>
-            <a:r>
-              <a:rPr lang="en-US" sz="1100" i="1" dirty="0" smtClean="0">
-                <a:latin typeface="Courier New" panose="02070309020205020404" pitchFamily="49" charset="0"/>
-                <a:cs typeface="Courier New" panose="02070309020205020404" pitchFamily="49" charset="0"/>
-              </a:rPr>
-              <a:t>branches.</a:t>
-            </a:r>
-          </a:p>
-          <a:p>
-            <a:pPr>
-              <a:lnSpc>
-                <a:spcPct val="150000"/>
-              </a:lnSpc>
-            </a:pPr>
-            <a:r>
-              <a:rPr lang="en-US" sz="1100" i="1" dirty="0" smtClean="0">
-                <a:latin typeface="Courier New" panose="02070309020205020404" pitchFamily="49" charset="0"/>
-                <a:cs typeface="Courier New" panose="02070309020205020404" pitchFamily="49" charset="0"/>
-              </a:rPr>
-              <a:t>$ git show-branch 			# Shows the branches and the commit history.</a:t>
-            </a:r>
-          </a:p>
-          <a:p>
-            <a:pPr>
-              <a:lnSpc>
-                <a:spcPct val="150000"/>
-              </a:lnSpc>
-            </a:pPr>
-            <a:r>
-              <a:rPr lang="en-US" sz="1100" i="1" dirty="0" smtClean="0">
-                <a:latin typeface="Courier New" panose="02070309020205020404" pitchFamily="49" charset="0"/>
-                <a:cs typeface="Courier New" panose="02070309020205020404" pitchFamily="49" charset="0"/>
-              </a:rPr>
-              <a:t>$ git merge &lt;branch name&gt;		# to merge the branch to into current branch</a:t>
-            </a:r>
-            <a:endParaRPr lang="en-US" sz="1100" i="1" dirty="0">
-              <a:latin typeface="Courier New" panose="02070309020205020404" pitchFamily="49" charset="0"/>
-              <a:cs typeface="Courier New" panose="02070309020205020404" pitchFamily="49" charset="0"/>
-            </a:endParaRPr>
-          </a:p>
-          <a:p>
-            <a:pPr>
-              <a:lnSpc>
-                <a:spcPct val="150000"/>
-              </a:lnSpc>
-            </a:pPr>
-            <a:r>
-              <a:rPr lang="en-US" sz="1400" b="1" i="1" dirty="0"/>
-              <a:t>Stashing your </a:t>
-            </a:r>
-            <a:r>
-              <a:rPr lang="en-US" sz="1400" b="1" i="1" dirty="0" smtClean="0"/>
-              <a:t>work:</a:t>
+              <a:t>.  In such situation you can use “git stash” command.</a:t>
             </a:r>
           </a:p>
           <a:p>
@@ -9660,22 +9852,49 @@
               <a:buChar char="v"/>
             </a:pPr>
             <a:r>
+              <a:rPr lang="en-US" sz="1100" i="1" dirty="0">
+                <a:latin typeface="+mj-lt"/>
+              </a:rPr>
+              <a:t>Git stash command perform below action:</a:t>
+            </a:r>
+          </a:p>
+          <a:p>
+            <a:pPr marL="685800" lvl="1" indent="-228600">
+              <a:lnSpc>
+                <a:spcPct val="150000"/>
+              </a:lnSpc>
+              <a:buFont typeface="+mj-lt"/>
+              <a:buAutoNum type="arabicPeriod"/>
+            </a:pPr>
+            <a:r>
+              <a:rPr lang="en-US" sz="1100" i="1" dirty="0">
+                <a:latin typeface="+mj-lt"/>
+              </a:rPr>
+              <a:t>Saves your working directory and index to a safe </a:t>
+            </a:r>
+            <a:r>
               <a:rPr lang="en-US" sz="1100" i="1" dirty="0" smtClean="0">
                 <a:latin typeface="+mj-lt"/>
               </a:rPr>
-              <a:t>If you are in situation that you </a:t>
-            </a:r>
+              <a:t>place.</a:t>
+            </a:r>
+            <a:endParaRPr lang="en-US" sz="1100" i="1" dirty="0">
+              <a:latin typeface="+mj-lt"/>
+            </a:endParaRPr>
+          </a:p>
+          <a:p>
+            <a:pPr marL="685800" lvl="1" indent="-228600">
+              <a:lnSpc>
+                <a:spcPct val="150000"/>
+              </a:lnSpc>
+              <a:buFont typeface="+mj-lt"/>
+              <a:buAutoNum type="arabicPeriod"/>
+            </a:pPr>
             <a:r>
               <a:rPr lang="en-US" sz="1100" i="1" dirty="0">
                 <a:latin typeface="+mj-lt"/>
               </a:rPr>
-              <a:t>modifying files in the working directory and/or index and you find out you need to fix a bug on a different branch. You can’t just switch to a different branch and lose all your work</a:t>
-            </a:r>
-            <a:r>
-              <a:rPr lang="en-US" sz="1100" i="1" dirty="0" smtClean="0">
-                <a:latin typeface="+mj-lt"/>
-              </a:rPr>
-              <a:t>.  In such situation you can use “git stash” command.</a:t>
+              <a:t>Restores your working directory and index to the most recent commit.</a:t>
             </a:r>
           </a:p>
           <a:p>
@@ -9687,49 +9906,46 @@
               <a:buChar char="v"/>
             </a:pPr>
             <a:r>
+              <a:rPr lang="en-US" sz="1100" i="1" dirty="0" smtClean="0">
+                <a:latin typeface="+mj-lt"/>
+              </a:rPr>
+              <a:t>Once you are done with the work </a:t>
+            </a:r>
+            <a:r>
               <a:rPr lang="en-US" sz="1100" i="1" dirty="0">
                 <a:latin typeface="+mj-lt"/>
               </a:rPr>
-              <a:t>Git stash command perform below action:</a:t>
-            </a:r>
-          </a:p>
-          <a:p>
-            <a:pPr marL="685800" lvl="1" indent="-228600">
-              <a:lnSpc>
-                <a:spcPct val="150000"/>
-              </a:lnSpc>
-              <a:buFont typeface="+mj-lt"/>
-              <a:buAutoNum type="arabicPeriod"/>
-            </a:pPr>
+              <a:t>on other branches, make commits, etc. and when you’re ready to get back to where you were, you type </a:t>
+            </a:r>
+            <a:r>
+              <a:rPr lang="en-US" sz="1100" i="1" dirty="0" smtClean="0">
+                <a:latin typeface="+mj-lt"/>
+              </a:rPr>
+              <a:t>“git </a:t>
+            </a:r>
             <a:r>
               <a:rPr lang="en-US" sz="1100" i="1" dirty="0">
                 <a:latin typeface="+mj-lt"/>
               </a:rPr>
-              <a:t>Saves your working directory and index to a safe </a:t>
+              <a:t>stash </a:t>
             </a:r>
             <a:r>
               <a:rPr lang="en-US" sz="1100" i="1" dirty="0" smtClean="0">
                 <a:latin typeface="+mj-lt"/>
               </a:rPr>
-              <a:t>place.</a:t>
-            </a:r>
-            <a:endParaRPr lang="en-US" sz="1100" i="1" dirty="0">
-              <a:latin typeface="+mj-lt"/>
-            </a:endParaRPr>
-          </a:p>
-          <a:p>
-            <a:pPr marL="685800" lvl="1" indent="-228600">
-              <a:lnSpc>
-                <a:spcPct val="150000"/>
-              </a:lnSpc>
-              <a:buFont typeface="+mj-lt"/>
-              <a:buAutoNum type="arabicPeriod"/>
-            </a:pPr>
+              <a:t>pop” </a:t>
+            </a:r>
             <a:r>
               <a:rPr lang="en-US" sz="1100" i="1" dirty="0">
                 <a:latin typeface="+mj-lt"/>
               </a:rPr>
-              <a:t>Restores your working directory and index to the most recent commit.</a:t>
+              <a:t>and you’re </a:t>
+            </a:r>
+            <a:r>
+              <a:rPr lang="en-US" sz="1100" i="1" dirty="0" smtClean="0">
+                <a:latin typeface="+mj-lt"/>
+              </a:rPr>
+              <a:t>back.</a:t>
             </a:r>
           </a:p>
           <a:p>
@@ -9741,46 +9957,46 @@
               <a:buChar char="v"/>
             </a:pPr>
             <a:r>
+              <a:rPr lang="en-US" sz="1100" b="1" i="1" u="sng" dirty="0" smtClean="0">
+                <a:latin typeface="+mj-lt"/>
+              </a:rPr>
+              <a:t>Note :</a:t>
+            </a:r>
+            <a:r>
+              <a:rPr lang="en-US" sz="1100" b="1" i="1" dirty="0" smtClean="0">
+                <a:latin typeface="+mj-lt"/>
+              </a:rPr>
+              <a:t>    “</a:t>
+            </a:r>
+            <a:r>
               <a:rPr lang="en-US" sz="1100" i="1" dirty="0" smtClean="0">
                 <a:latin typeface="+mj-lt"/>
               </a:rPr>
-              <a:t>Once you are done with the work </a:t>
+              <a:t>git stash” </a:t>
             </a:r>
             <a:r>
               <a:rPr lang="en-US" sz="1100" i="1" dirty="0">
                 <a:latin typeface="+mj-lt"/>
               </a:rPr>
-              <a:t>on other branches, make commits, etc. and when you’re ready to get back to where you were, you type </a:t>
+              <a:t>will not stash (save) files in the working directory unless the files are being </a:t>
+            </a:r>
+            <a:r>
+              <a:rPr lang="en-US" sz="1100" i="1" u="sng" dirty="0">
+                <a:latin typeface="+mj-lt"/>
+              </a:rPr>
+              <a:t>tracked</a:t>
+            </a:r>
+            <a:r>
+              <a:rPr lang="en-US" sz="1100" i="1" dirty="0">
+                <a:latin typeface="+mj-lt"/>
+              </a:rPr>
+              <a:t> (some version of the file has been added to the index</a:t>
             </a:r>
             <a:r>
               <a:rPr lang="en-US" sz="1100" i="1" dirty="0" smtClean="0">
                 <a:latin typeface="+mj-lt"/>
               </a:rPr>
-              <a:t>“git </a:t>
-            </a:r>
-            <a:r>
-              <a:rPr lang="en-US" sz="1100" i="1" dirty="0">
-                <a:latin typeface="+mj-lt"/>
-              </a:rPr>
-              <a:t>stash </a:t>
-            </a:r>
-            <a:r>
-              <a:rPr lang="en-US" sz="1100" i="1" dirty="0" smtClean="0">
-                <a:latin typeface="+mj-lt"/>
-              </a:rPr>
-              <a:t>pop” </a:t>
-            </a:r>
-            <a:r>
-              <a:rPr lang="en-US" sz="1100" i="1" dirty="0">
-                <a:latin typeface="+mj-lt"/>
-              </a:rPr>
-              <a:t>and you’re </a:t>
-            </a:r>
-            <a:r>
-              <a:rPr lang="en-US" sz="1100" i="1" dirty="0" smtClean="0">
-                <a:latin typeface="+mj-lt"/>
-              </a:rPr>
-              <a:t>back.</a:t>
+              <a:t>).</a:t>
             </a:r>
           </a:p>
           <a:p>
@@ -9792,57 +10008,6 @@
               <a:buChar char="v"/>
             </a:pPr>
             <a:r>
-              <a:rPr lang="en-US" sz="1100" b="1" i="1" u="sng" dirty="0" smtClean="0">
-                <a:latin typeface="+mj-lt"/>
-              </a:rPr>
-              <a:t>Note :</a:t>
-            </a:r>
-            <a:r>
-              <a:rPr lang="en-US" sz="1100" b="1" i="1" dirty="0" smtClean="0">
-                <a:latin typeface="+mj-lt"/>
-              </a:rPr>
-              <a:t>    “</a:t>
-            </a:r>
-            <a:r>
-              <a:rPr lang="en-US" sz="1100" i="1" dirty="0" smtClean="0">
-                <a:latin typeface="+mj-lt"/>
-              </a:rPr>
-              <a:t>git stash” </a:t>
-            </a:r>
-            <a:r>
-              <a:rPr lang="en-US" sz="1100" i="1" dirty="0">
-                <a:latin typeface="+mj-lt"/>
-              </a:rPr>
-              <a:t>will not stash (save) files in the working directory unless the files are being </a:t>
-            </a:r>
-            <a:r>
-              <a:rPr lang="en-US" sz="1100" i="1" u="sng" dirty="0">
-                <a:latin typeface="+mj-lt"/>
-              </a:rPr>
-              <a:t>tracked</a:t>
-            </a:r>
-            <a:r>
-              <a:rPr lang="en-US" sz="1100" i="1" dirty="0">
-                <a:latin typeface="+mj-lt"/>
-              </a:rPr>
-              <a:t> (some version of the file has been added to the index</a:t>
-            </a:r>
-            <a:r>
-              <a:rPr lang="en-US" sz="1100" i="1" dirty="0" smtClean="0">
-                <a:latin typeface="+mj-lt"/>
-              </a:rPr>
-              <a:t>).</a:t>
-            </a:r>
-          </a:p>
-          <a:p>
-            <a:pPr marL="171450" indent="-171450">
-              <a:lnSpc>
-                <a:spcPct val="150000"/>
-              </a:lnSpc>
-              <a:buFont typeface="Wingdings" panose="05000000000000000000" pitchFamily="2" charset="2"/>
-              <a:buChar char="v"/>
-            </a:pPr>
-            <a:r>
               <a:rPr lang="en-US" sz="1100" i="1" dirty="0">
                 <a:latin typeface="+mj-lt"/>
               </a:rPr>
@@ -9957,60 +10122,6 @@
               </a:rPr>
               <a:t>To retrieve the saved files details  into working directory.</a:t>
             </a:r>
-          </a:p>
-        </p:txBody>
-      </p:sp>
-      <p:sp>
-        <p:nvSpPr>
-          <p:cNvPr id="4" name="TextBox 3"/>
-          <p:cNvSpPr txBox="1"/>
-          <p:nvPr/>
-        </p:nvSpPr>
-        <p:spPr>
-          <a:xfrm>
-            <a:off x="414779" y="160256"/>
-            <a:ext cx="11566689" cy="400110"/>
-          </a:xfrm>
-          <a:prstGeom prst="rect">
-            <a:avLst/>
-          </a:prstGeom>
-          <a:noFill/>
-        </p:spPr>
-        <p:txBody>
-          <a:bodyPr wrap="square" rtlCol="0">
-            <a:spAutoFit/>
-          </a:bodyPr>
-          <a:lstStyle/>
-          <a:p>
-            <a:r>
-              <a:rPr lang="en-US" sz="2000" i="1" dirty="0" smtClean="0">
-                <a:ln w="0"/>
-                <a:solidFill>
-                  <a:schemeClr val="accent1"/>
-                </a:solidFill>
-                <a:effectLst>
-                  <a:outerShdw blurRad="38100" dist="25400" dir="5400000" algn="ctr" rotWithShape="0">
-                    <a:srgbClr val="6E747A">
-                      <a:alpha val="43000"/>
-                    </a:srgbClr>
-                  </a:outerShdw>
-                </a:effectLst>
-              </a:rPr>
-              <a:t>    Git  Branching &amp; Stashing</a:t>
-            </a:r>
-            <a:endParaRPr lang="en-US" sz="2000" i="1" dirty="0">
-              <a:ln w="0"/>
-              <a:solidFill>
-                <a:schemeClr val="accent1"/>
-              </a:solidFill>
-              <a:effectLst>
-                <a:outerShdw blurRad="38100" dist="25400" dir="5400000" algn="ctr" rotWithShape="0">
-                  <a:srgbClr val="6E747A">
-                    <a:alpha val="43000"/>
-                  </a:srgbClr>
-                </a:outerShdw>
-              </a:effectLst>
-            </a:endParaRPr>
           </a:p>
         </p:txBody>
       </p:sp>
@@ -10044,6 +10155,60 @@
           </a:fontRef>
         </p:style>
       </p:cxnSp>
+      <p:sp>
+        <p:nvSpPr>
+          <p:cNvPr id="6" name="TextBox 5"/>
+          <p:cNvSpPr txBox="1"/>
+          <p:nvPr/>
+        </p:nvSpPr>
+        <p:spPr>
+          <a:xfrm>
+            <a:off x="225560" y="197642"/>
+            <a:ext cx="11566689" cy="400110"/>
+          </a:xfrm>
+          <a:prstGeom prst="rect">
+            <a:avLst/>
+          </a:prstGeom>
+          <a:noFill/>
+        </p:spPr>
+        <p:txBody>
+          <a:bodyPr wrap="square" rtlCol="0">
+            <a:spAutoFit/>
+          </a:bodyPr>
+          <a:lstStyle/>
+          <a:p>
+            <a:r>
+              <a:rPr lang="en-US" sz="2000" i="1" dirty="0" smtClean="0">
+                <a:ln w="0"/>
+                <a:solidFill>
+                  <a:schemeClr val="accent1"/>
+                </a:solidFill>
+                <a:effectLst>
+                  <a:outerShdw blurRad="38100" dist="25400" dir="5400000" algn="ctr" rotWithShape="0">
+                    <a:srgbClr val="6E747A">
+                      <a:alpha val="43000"/>
+                    </a:srgbClr>
+                  </a:outerShdw>
+                </a:effectLst>
+              </a:rPr>
+              <a:t>    Git  command line operations Continued ….</a:t>
+            </a:r>
+            <a:endParaRPr lang="en-US" sz="2000" i="1" dirty="0">
+              <a:ln w="0"/>
+              <a:solidFill>
+                <a:schemeClr val="accent1"/>
+              </a:solidFill>
+              <a:effectLst>
+                <a:outerShdw blurRad="38100" dist="25400" dir="5400000" algn="ctr" rotWithShape="0">
+                  <a:srgbClr val="6E747A">
+                    <a:alpha val="43000"/>
+                  </a:srgbClr>
+                </a:outerShdw>
+              </a:effectLst>
+            </a:endParaRPr>
+          </a:p>
+        </p:txBody>
+      </p:sp>
     </p:spTree>
     <p:extLst>
       <p:ext uri="{BB962C8B-B14F-4D97-AF65-F5344CB8AC3E}">
@@ -10065,6 +10230,1094 @@
 </file>
 
 <file path=ppt/slides/slide19.xml><?xml version="1.0" encoding="utf-8"?>
+<p:sld xmlns:a="http://schemas.openxmlformats.org/drawingml/2006/main" xmlns:r="http://schemas.openxmlformats.org/officeDocument/2006/relationships" xmlns:p="http://schemas.openxmlformats.org/presentationml/2006/main">
+  <p:cSld>
+    <p:spTree>
+      <p:nvGrpSpPr>
+        <p:cNvPr id="1" name=""/>
+        <p:cNvGrpSpPr/>
+        <p:nvPr/>
+      </p:nvGrpSpPr>
+      <p:grpSpPr>
+        <a:xfrm>
+          <a:off x="0" y="0"/>
+          <a:ext cx="0" cy="0"/>
+          <a:chOff x="0" y="0"/>
+          <a:chExt cx="0" cy="0"/>
+        </a:xfrm>
+      </p:grpSpPr>
+      <p:sp>
+        <p:nvSpPr>
+          <p:cNvPr id="3" name="Footer Placeholder 2"/>
+          <p:cNvSpPr>
+            <a:spLocks noGrp="1"/>
+          </p:cNvSpPr>
+          <p:nvPr>
+            <p:ph type="ftr" sz="quarter" idx="11"/>
+          </p:nvPr>
+        </p:nvSpPr>
+        <p:spPr/>
+        <p:txBody>
+          <a:bodyPr/>
+          <a:lstStyle/>
+          <a:p>
+            <a:r>
+              <a:rPr lang="en-US" dirty="0" smtClean="0"/>
+              <a:t>PUBLIC</a:t>
+            </a:r>
+            <a:endParaRPr lang="en-US" dirty="0"/>
+          </a:p>
+        </p:txBody>
+      </p:sp>
+      <p:cxnSp>
+        <p:nvCxnSpPr>
+          <p:cNvPr id="4" name="Straight Connector 3"/>
+          <p:cNvCxnSpPr/>
+          <p:nvPr/>
+        </p:nvCxnSpPr>
+        <p:spPr>
+          <a:xfrm flipV="1">
+            <a:off x="547436" y="645998"/>
+            <a:ext cx="11244813" cy="9427"/>
+          </a:xfrm>
+          <a:prstGeom prst="line">
+            <a:avLst/>
+          </a:prstGeom>
+        </p:spPr>
+        <p:style>
+          <a:lnRef idx="3">
+            <a:schemeClr val="accent5"/>
+          </a:lnRef>
+          <a:fillRef idx="0">
+            <a:schemeClr val="accent5"/>
+          </a:fillRef>
+          <a:effectRef idx="2">
+            <a:schemeClr val="accent5"/>
+          </a:effectRef>
+          <a:fontRef idx="minor">
+            <a:schemeClr val="tx1"/>
+          </a:fontRef>
+        </p:style>
+      </p:cxnSp>
+      <p:sp>
+        <p:nvSpPr>
+          <p:cNvPr id="5" name="TextBox 4"/>
+          <p:cNvSpPr txBox="1"/>
+          <p:nvPr/>
+        </p:nvSpPr>
+        <p:spPr>
+          <a:xfrm>
+            <a:off x="225560" y="197642"/>
+            <a:ext cx="11566689" cy="400110"/>
+          </a:xfrm>
+          <a:prstGeom prst="rect">
+            <a:avLst/>
+          </a:prstGeom>
+          <a:noFill/>
+        </p:spPr>
+        <p:txBody>
+          <a:bodyPr wrap="square" rtlCol="0">
+            <a:spAutoFit/>
+          </a:bodyPr>
+          <a:lstStyle/>
+          <a:p>
+            <a:r>
+              <a:rPr lang="en-US" sz="2000" i="1" dirty="0" smtClean="0">
+                <a:ln w="0"/>
+                <a:solidFill>
+                  <a:schemeClr val="accent1"/>
+                </a:solidFill>
+                <a:effectLst>
+                  <a:outerShdw blurRad="38100" dist="25400" dir="5400000" algn="ctr" rotWithShape="0">
+                    <a:srgbClr val="6E747A">
+                      <a:alpha val="43000"/>
+                    </a:srgbClr>
+                  </a:outerShdw>
+                </a:effectLst>
+              </a:rPr>
+              <a:t>    Git  command line operations Continued ….</a:t>
+            </a:r>
+            <a:endParaRPr lang="en-US" sz="2000" i="1" dirty="0">
+              <a:ln w="0"/>
+              <a:solidFill>
+                <a:schemeClr val="accent1"/>
+              </a:solidFill>
+              <a:effectLst>
+                <a:outerShdw blurRad="38100" dist="25400" dir="5400000" algn="ctr" rotWithShape="0">
+                  <a:srgbClr val="6E747A">
+                    <a:alpha val="43000"/>
+                  </a:srgbClr>
+                </a:outerShdw>
+              </a:effectLst>
+            </a:endParaRPr>
+          </a:p>
+        </p:txBody>
+      </p:sp>
+      <p:sp>
+        <p:nvSpPr>
+          <p:cNvPr id="6" name="Rectangle 5"/>
+          <p:cNvSpPr/>
+          <p:nvPr/>
+        </p:nvSpPr>
+        <p:spPr>
+          <a:xfrm>
+            <a:off x="547435" y="791609"/>
+            <a:ext cx="11244813" cy="1908215"/>
+          </a:xfrm>
+          <a:prstGeom prst="rect">
+            <a:avLst/>
+          </a:prstGeom>
+        </p:spPr>
+        <p:txBody>
+          <a:bodyPr wrap="square">
+            <a:spAutoFit/>
+          </a:bodyPr>
+          <a:lstStyle/>
+          <a:p>
+            <a:pPr marL="171450" indent="-171450">
+              <a:buFont typeface="Wingdings" panose="05000000000000000000" pitchFamily="2" charset="2"/>
+              <a:buChar char="v"/>
+            </a:pPr>
+            <a:endParaRPr lang="en-US" sz="1100" i="1" dirty="0" smtClean="0">
+              <a:latin typeface="+mj-lt"/>
+            </a:endParaRPr>
+          </a:p>
+          <a:p>
+            <a:pPr marL="171450" indent="-171450">
+              <a:buFont typeface="Wingdings" panose="05000000000000000000" pitchFamily="2" charset="2"/>
+              <a:buChar char="v"/>
+            </a:pPr>
+            <a:r>
+              <a:rPr lang="en-US" sz="1100" i="1" dirty="0" smtClean="0">
+                <a:latin typeface="+mj-lt"/>
+              </a:rPr>
+              <a:t>Git Tag object is use  assign the version name to the deployable code after doing multiple commits into the code . </a:t>
+            </a:r>
+          </a:p>
+          <a:p>
+            <a:endParaRPr lang="en-US" sz="1100" i="1" dirty="0">
+              <a:latin typeface="+mj-lt"/>
+            </a:endParaRPr>
+          </a:p>
+          <a:p>
+            <a:pPr marL="171450" indent="-171450">
+              <a:buFont typeface="Wingdings" panose="05000000000000000000" pitchFamily="2" charset="2"/>
+              <a:buChar char="v"/>
+            </a:pPr>
+            <a:r>
+              <a:rPr lang="en-US" sz="1100" i="1" dirty="0" smtClean="0">
+                <a:latin typeface="+mj-lt"/>
+              </a:rPr>
+              <a:t>Lightweight </a:t>
+            </a:r>
+            <a:r>
+              <a:rPr lang="en-US" sz="1100" i="1" dirty="0">
+                <a:latin typeface="+mj-lt"/>
+              </a:rPr>
+              <a:t>tags</a:t>
+            </a:r>
+          </a:p>
+          <a:p>
+            <a:pPr lvl="1"/>
+            <a:r>
+              <a:rPr lang="en-US" sz="1000" i="1" dirty="0">
+                <a:latin typeface="Courier New" panose="02070309020205020404" pitchFamily="49" charset="0"/>
+                <a:cs typeface="Courier New" panose="02070309020205020404" pitchFamily="49" charset="0"/>
+              </a:rPr>
+              <a:t>$ git tag &lt;tagname&gt; &lt;commit</a:t>
+            </a:r>
+            <a:r>
+              <a:rPr lang="en-US" sz="1000" i="1" dirty="0">
+                <a:latin typeface="Courier New" panose="02070309020205020404" pitchFamily="49" charset="0"/>
+                <a:cs typeface="Courier New" panose="02070309020205020404" pitchFamily="49" charset="0"/>
+              </a:rPr>
+              <a:t>&gt;  	# creates </a:t>
+            </a:r>
+            <a:r>
+              <a:rPr lang="en-US" sz="1000" i="1" dirty="0">
+                <a:latin typeface="Courier New" panose="02070309020205020404" pitchFamily="49" charset="0"/>
+                <a:cs typeface="Courier New" panose="02070309020205020404" pitchFamily="49" charset="0"/>
+              </a:rPr>
+              <a:t>a tag called &lt;tagname&gt; that points to &lt;commit</a:t>
+            </a:r>
+            <a:r>
+              <a:rPr lang="en-US" sz="1000" i="1" dirty="0">
+                <a:latin typeface="Courier New" panose="02070309020205020404" pitchFamily="49" charset="0"/>
+                <a:cs typeface="Courier New" panose="02070309020205020404" pitchFamily="49" charset="0"/>
+              </a:rPr>
+              <a:t>&gt;</a:t>
+            </a:r>
+          </a:p>
+          <a:p>
+            <a:pPr lvl="1"/>
+            <a:endParaRPr lang="en-US" sz="1100" i="1" dirty="0">
+              <a:latin typeface="+mj-lt"/>
+            </a:endParaRPr>
+          </a:p>
+          <a:p>
+            <a:pPr marL="171450" indent="-171450">
+              <a:buFont typeface="Wingdings" panose="05000000000000000000" pitchFamily="2" charset="2"/>
+              <a:buChar char="v"/>
+            </a:pPr>
+            <a:r>
+              <a:rPr lang="en-US" sz="1100" i="1" dirty="0">
+                <a:latin typeface="+mj-lt"/>
+              </a:rPr>
+              <a:t>Tag objects</a:t>
+            </a:r>
+          </a:p>
+          <a:p>
+            <a:pPr lvl="1"/>
+            <a:r>
+              <a:rPr lang="en-US" sz="1000" i="1" dirty="0">
+                <a:latin typeface="Courier New" panose="02070309020205020404" pitchFamily="49" charset="0"/>
+                <a:cs typeface="Courier New" panose="02070309020205020404" pitchFamily="49" charset="0"/>
+              </a:rPr>
+              <a:t>$ git tag -a &lt;tagname</a:t>
+            </a:r>
+            <a:r>
+              <a:rPr lang="en-US" sz="1000" i="1" dirty="0">
+                <a:latin typeface="Courier New" panose="02070309020205020404" pitchFamily="49" charset="0"/>
+                <a:cs typeface="Courier New" panose="02070309020205020404" pitchFamily="49" charset="0"/>
+              </a:rPr>
+              <a:t>&gt; &lt;</a:t>
+            </a:r>
+            <a:r>
+              <a:rPr lang="en-US" sz="1000" i="1" dirty="0" smtClean="0">
+                <a:latin typeface="Courier New" panose="02070309020205020404" pitchFamily="49" charset="0"/>
+                <a:cs typeface="Courier New" panose="02070309020205020404" pitchFamily="49" charset="0"/>
+              </a:rPr>
+              <a:t>commit&gt;	# creates </a:t>
+            </a:r>
+            <a:r>
+              <a:rPr lang="en-US" sz="1000" i="1" dirty="0">
+                <a:latin typeface="Courier New" panose="02070309020205020404" pitchFamily="49" charset="0"/>
+                <a:cs typeface="Courier New" panose="02070309020205020404" pitchFamily="49" charset="0"/>
+              </a:rPr>
+              <a:t>a tag object and opens a text editor where you can type a tag message </a:t>
+            </a:r>
+          </a:p>
+          <a:p>
+            <a:pPr lvl="1"/>
+            <a:endParaRPr lang="en-US" sz="1100" i="1" dirty="0">
+              <a:latin typeface="+mj-lt"/>
+            </a:endParaRPr>
+          </a:p>
+          <a:p>
+            <a:pPr marL="171450" indent="-171450">
+              <a:buFont typeface="Wingdings" panose="05000000000000000000" pitchFamily="2" charset="2"/>
+              <a:buChar char="v"/>
+            </a:pPr>
+            <a:r>
+              <a:rPr lang="en-US" sz="1100" i="1" dirty="0">
+                <a:latin typeface="+mj-lt"/>
+              </a:rPr>
+              <a:t>List all tags</a:t>
+            </a:r>
+          </a:p>
+          <a:p>
+            <a:pPr lvl="1"/>
+            <a:r>
+              <a:rPr lang="en-US" sz="1000" i="1" dirty="0">
+                <a:latin typeface="Courier New" panose="02070309020205020404" pitchFamily="49" charset="0"/>
+                <a:cs typeface="Courier New" panose="02070309020205020404" pitchFamily="49" charset="0"/>
+              </a:rPr>
+              <a:t>$ git tag</a:t>
+            </a:r>
+          </a:p>
+        </p:txBody>
+      </p:sp>
+    </p:spTree>
+    <p:extLst>
+      <p:ext uri="{BB962C8B-B14F-4D97-AF65-F5344CB8AC3E}">
+        <p14:creationId xmlns:p14="http://schemas.microsoft.com/office/powerpoint/2010/main" val="1380574977"/>
+      </p:ext>
+    </p:extLst>
+  </p:cSld>
+  <p:clrMapOvr>
+    <a:masterClrMapping/>
+  </p:clrMapOvr>
+</p:sld>
+</file>
+
+<file path=ppt/slides/slide2.xml><?xml version="1.0" encoding="utf-8"?>
+<p:sld xmlns:a="http://schemas.openxmlformats.org/drawingml/2006/main" xmlns:r="http://schemas.openxmlformats.org/officeDocument/2006/relationships" xmlns:p="http://schemas.openxmlformats.org/presentationml/2006/main">
+  <p:cSld>
+    <p:spTree>
+      <p:nvGrpSpPr>
+        <p:cNvPr id="1" name=""/>
+        <p:cNvGrpSpPr/>
+        <p:nvPr/>
+      </p:nvGrpSpPr>
+      <p:grpSpPr>
+        <a:xfrm>
+          <a:off x="0" y="0"/>
+          <a:ext cx="0" cy="0"/>
+          <a:chOff x="0" y="0"/>
+          <a:chExt cx="0" cy="0"/>
+        </a:xfrm>
+      </p:grpSpPr>
+      <p:sp>
+        <p:nvSpPr>
+          <p:cNvPr id="5" name="Footer Placeholder 4"/>
+          <p:cNvSpPr>
+            <a:spLocks noGrp="1"/>
+          </p:cNvSpPr>
+          <p:nvPr>
+            <p:ph type="ftr" sz="quarter" idx="11"/>
+          </p:nvPr>
+        </p:nvSpPr>
+        <p:spPr/>
+        <p:txBody>
+          <a:bodyPr/>
+          <a:lstStyle/>
+          <a:p>
+            <a:r>
+              <a:rPr lang="en-US" dirty="0" smtClean="0"/>
+              <a:t>PUBLIC</a:t>
+            </a:r>
+            <a:endParaRPr lang="en-US" dirty="0"/>
+          </a:p>
+        </p:txBody>
+      </p:sp>
+      <p:sp>
+        <p:nvSpPr>
+          <p:cNvPr id="4" name="TextBox 3"/>
+          <p:cNvSpPr txBox="1"/>
+          <p:nvPr/>
+        </p:nvSpPr>
+        <p:spPr>
+          <a:xfrm>
+            <a:off x="414779" y="160256"/>
+            <a:ext cx="11566689" cy="400110"/>
+          </a:xfrm>
+          <a:prstGeom prst="rect">
+            <a:avLst/>
+          </a:prstGeom>
+          <a:noFill/>
+        </p:spPr>
+        <p:txBody>
+          <a:bodyPr wrap="square" rtlCol="0">
+            <a:spAutoFit/>
+          </a:bodyPr>
+          <a:lstStyle/>
+          <a:p>
+            <a:r>
+              <a:rPr lang="en-US" sz="2000" i="1" dirty="0" smtClean="0">
+                <a:ln w="0"/>
+                <a:solidFill>
+                  <a:schemeClr val="accent1"/>
+                </a:solidFill>
+                <a:effectLst>
+                  <a:outerShdw blurRad="38100" dist="25400" dir="5400000" algn="ctr" rotWithShape="0">
+                    <a:srgbClr val="6E747A">
+                      <a:alpha val="43000"/>
+                    </a:srgbClr>
+                  </a:outerShdw>
+                </a:effectLst>
+              </a:rPr>
+              <a:t>  Table of Contents</a:t>
+            </a:r>
+            <a:endParaRPr lang="en-US" sz="2000" i="1" dirty="0">
+              <a:ln w="0"/>
+              <a:solidFill>
+                <a:schemeClr val="accent1"/>
+              </a:solidFill>
+              <a:effectLst>
+                <a:outerShdw blurRad="38100" dist="25400" dir="5400000" algn="ctr" rotWithShape="0">
+                  <a:srgbClr val="6E747A">
+                    <a:alpha val="43000"/>
+                  </a:srgbClr>
+                </a:outerShdw>
+              </a:effectLst>
+            </a:endParaRPr>
+          </a:p>
+        </p:txBody>
+      </p:sp>
+      <p:cxnSp>
+        <p:nvCxnSpPr>
+          <p:cNvPr id="6" name="Straight Connector 5"/>
+          <p:cNvCxnSpPr/>
+          <p:nvPr/>
+        </p:nvCxnSpPr>
+        <p:spPr>
+          <a:xfrm flipV="1">
+            <a:off x="547436" y="645998"/>
+            <a:ext cx="11244813" cy="9427"/>
+          </a:xfrm>
+          <a:prstGeom prst="line">
+            <a:avLst/>
+          </a:prstGeom>
+        </p:spPr>
+        <p:style>
+          <a:lnRef idx="3">
+            <a:schemeClr val="accent5"/>
+          </a:lnRef>
+          <a:fillRef idx="0">
+            <a:schemeClr val="accent5"/>
+          </a:fillRef>
+          <a:effectRef idx="2">
+            <a:schemeClr val="accent5"/>
+          </a:effectRef>
+          <a:fontRef idx="minor">
+            <a:schemeClr val="tx1"/>
+          </a:fontRef>
+        </p:style>
+      </p:cxnSp>
+      <p:sp>
+        <p:nvSpPr>
+          <p:cNvPr id="7" name="Rounded Rectangle 6"/>
+          <p:cNvSpPr/>
+          <p:nvPr/>
+        </p:nvSpPr>
+        <p:spPr>
+          <a:xfrm>
+            <a:off x="2743200" y="1364490"/>
+            <a:ext cx="5204298" cy="444855"/>
+          </a:xfrm>
+          <a:prstGeom prst="roundRect">
+            <a:avLst/>
+          </a:prstGeom>
+          <a:solidFill>
+            <a:schemeClr val="bg1">
+              <a:lumMod val="95000"/>
+            </a:schemeClr>
+          </a:solidFill>
+          <a:effectLst>
+            <a:innerShdw blurRad="63500" dist="50800" dir="8100000">
+              <a:prstClr val="black">
+                <a:alpha val="50000"/>
+              </a:prstClr>
+            </a:innerShdw>
+          </a:effectLst>
+        </p:spPr>
+        <p:style>
+          <a:lnRef idx="1">
+            <a:schemeClr val="accent1"/>
+          </a:lnRef>
+          <a:fillRef idx="2">
+            <a:schemeClr val="accent1"/>
+          </a:fillRef>
+          <a:effectRef idx="1">
+            <a:schemeClr val="accent1"/>
+          </a:effectRef>
+          <a:fontRef idx="minor">
+            <a:schemeClr val="dk1"/>
+          </a:fontRef>
+        </p:style>
+        <p:txBody>
+          <a:bodyPr rtlCol="0" anchor="ctr"/>
+          <a:lstStyle/>
+          <a:p>
+            <a:r>
+              <a:rPr lang="en-US" i="1" dirty="0" smtClean="0">
+                <a:solidFill>
+                  <a:schemeClr val="tx1"/>
+                </a:solidFill>
+              </a:rPr>
+              <a:t>Version Control System and Understanding Git</a:t>
+            </a:r>
+            <a:endParaRPr lang="en-US" i="1" dirty="0">
+              <a:solidFill>
+                <a:schemeClr val="tx1"/>
+              </a:solidFill>
+            </a:endParaRPr>
+          </a:p>
+        </p:txBody>
+      </p:sp>
+      <p:sp>
+        <p:nvSpPr>
+          <p:cNvPr id="8" name="Oval 7"/>
+          <p:cNvSpPr/>
+          <p:nvPr/>
+        </p:nvSpPr>
+        <p:spPr>
+          <a:xfrm>
+            <a:off x="2071993" y="1361289"/>
+            <a:ext cx="486381" cy="448056"/>
+          </a:xfrm>
+          <a:prstGeom prst="ellipse">
+            <a:avLst/>
+          </a:prstGeom>
+        </p:spPr>
+        <p:style>
+          <a:lnRef idx="1">
+            <a:schemeClr val="accent1"/>
+          </a:lnRef>
+          <a:fillRef idx="2">
+            <a:schemeClr val="accent1"/>
+          </a:fillRef>
+          <a:effectRef idx="1">
+            <a:schemeClr val="accent1"/>
+          </a:effectRef>
+          <a:fontRef idx="minor">
+            <a:schemeClr val="dk1"/>
+          </a:fontRef>
+        </p:style>
+        <p:txBody>
+          <a:bodyPr rtlCol="0" anchor="ctr"/>
+          <a:lstStyle/>
+          <a:p>
+            <a:pPr algn="ctr"/>
+            <a:r>
+              <a:rPr lang="en-US" dirty="0" smtClean="0"/>
+              <a:t>1</a:t>
+            </a:r>
+            <a:endParaRPr lang="en-US" dirty="0"/>
+          </a:p>
+        </p:txBody>
+      </p:sp>
+      <p:sp>
+        <p:nvSpPr>
+          <p:cNvPr id="9" name="Rounded Rectangle 8"/>
+          <p:cNvSpPr/>
+          <p:nvPr/>
+        </p:nvSpPr>
+        <p:spPr>
+          <a:xfrm>
+            <a:off x="2743200" y="3434894"/>
+            <a:ext cx="5204298" cy="444855"/>
+          </a:xfrm>
+          <a:prstGeom prst="roundRect">
+            <a:avLst/>
+          </a:prstGeom>
+          <a:solidFill>
+            <a:schemeClr val="bg1">
+              <a:lumMod val="95000"/>
+            </a:schemeClr>
+          </a:solidFill>
+          <a:effectLst>
+            <a:innerShdw blurRad="63500" dist="50800" dir="8100000">
+              <a:prstClr val="black">
+                <a:alpha val="50000"/>
+              </a:prstClr>
+            </a:innerShdw>
+          </a:effectLst>
+        </p:spPr>
+        <p:style>
+          <a:lnRef idx="1">
+            <a:schemeClr val="accent1"/>
+          </a:lnRef>
+          <a:fillRef idx="2">
+            <a:schemeClr val="accent1"/>
+          </a:fillRef>
+          <a:effectRef idx="1">
+            <a:schemeClr val="accent1"/>
+          </a:effectRef>
+          <a:fontRef idx="minor">
+            <a:schemeClr val="dk1"/>
+          </a:fontRef>
+        </p:style>
+        <p:txBody>
+          <a:bodyPr rtlCol="0" anchor="ctr"/>
+          <a:lstStyle/>
+          <a:p>
+            <a:r>
+              <a:rPr lang="en-US" i="1" dirty="0" smtClean="0">
+                <a:solidFill>
+                  <a:schemeClr val="tx1"/>
+                </a:solidFill>
+              </a:rPr>
+              <a:t>GitHub Desktop</a:t>
+            </a:r>
+            <a:endParaRPr lang="en-US" i="1" dirty="0">
+              <a:solidFill>
+                <a:schemeClr val="tx1"/>
+              </a:solidFill>
+            </a:endParaRPr>
+          </a:p>
+        </p:txBody>
+      </p:sp>
+      <p:sp>
+        <p:nvSpPr>
+          <p:cNvPr id="10" name="Oval 9"/>
+          <p:cNvSpPr/>
+          <p:nvPr/>
+        </p:nvSpPr>
+        <p:spPr>
+          <a:xfrm>
+            <a:off x="2071991" y="2741559"/>
+            <a:ext cx="486381" cy="448056"/>
+          </a:xfrm>
+          <a:prstGeom prst="ellipse">
+            <a:avLst/>
+          </a:prstGeom>
+        </p:spPr>
+        <p:style>
+          <a:lnRef idx="1">
+            <a:schemeClr val="accent1"/>
+          </a:lnRef>
+          <a:fillRef idx="2">
+            <a:schemeClr val="accent1"/>
+          </a:fillRef>
+          <a:effectRef idx="1">
+            <a:schemeClr val="accent1"/>
+          </a:effectRef>
+          <a:fontRef idx="minor">
+            <a:schemeClr val="dk1"/>
+          </a:fontRef>
+        </p:style>
+        <p:txBody>
+          <a:bodyPr rtlCol="0" anchor="ctr"/>
+          <a:lstStyle/>
+          <a:p>
+            <a:pPr algn="ctr"/>
+            <a:r>
+              <a:rPr lang="en-US" dirty="0"/>
+              <a:t>3</a:t>
+            </a:r>
+          </a:p>
+        </p:txBody>
+      </p:sp>
+      <p:sp>
+        <p:nvSpPr>
+          <p:cNvPr id="11" name="Rounded Rectangle 10"/>
+          <p:cNvSpPr/>
+          <p:nvPr/>
+        </p:nvSpPr>
+        <p:spPr>
+          <a:xfrm>
+            <a:off x="2743200" y="2744760"/>
+            <a:ext cx="5204298" cy="444855"/>
+          </a:xfrm>
+          <a:prstGeom prst="roundRect">
+            <a:avLst/>
+          </a:prstGeom>
+          <a:solidFill>
+            <a:schemeClr val="bg1">
+              <a:lumMod val="95000"/>
+            </a:schemeClr>
+          </a:solidFill>
+          <a:effectLst>
+            <a:innerShdw blurRad="63500" dist="50800" dir="8100000">
+              <a:prstClr val="black">
+                <a:alpha val="50000"/>
+              </a:prstClr>
+            </a:innerShdw>
+          </a:effectLst>
+        </p:spPr>
+        <p:style>
+          <a:lnRef idx="1">
+            <a:schemeClr val="accent1"/>
+          </a:lnRef>
+          <a:fillRef idx="2">
+            <a:schemeClr val="accent1"/>
+          </a:fillRef>
+          <a:effectRef idx="1">
+            <a:schemeClr val="accent1"/>
+          </a:effectRef>
+          <a:fontRef idx="minor">
+            <a:schemeClr val="dk1"/>
+          </a:fontRef>
+        </p:style>
+        <p:txBody>
+          <a:bodyPr rtlCol="0" anchor="ctr"/>
+          <a:lstStyle/>
+          <a:p>
+            <a:r>
+              <a:rPr lang="en-US" i="1" dirty="0" smtClean="0">
+                <a:solidFill>
+                  <a:schemeClr val="tx1"/>
+                </a:solidFill>
+              </a:rPr>
+              <a:t>Git Command Line operation</a:t>
+            </a:r>
+            <a:endParaRPr lang="en-US" i="1" dirty="0">
+              <a:solidFill>
+                <a:schemeClr val="tx1"/>
+              </a:solidFill>
+            </a:endParaRPr>
+          </a:p>
+        </p:txBody>
+      </p:sp>
+      <p:sp>
+        <p:nvSpPr>
+          <p:cNvPr id="12" name="Oval 11"/>
+          <p:cNvSpPr/>
+          <p:nvPr/>
+        </p:nvSpPr>
+        <p:spPr>
+          <a:xfrm>
+            <a:off x="2071992" y="3431693"/>
+            <a:ext cx="486381" cy="448056"/>
+          </a:xfrm>
+          <a:prstGeom prst="ellipse">
+            <a:avLst/>
+          </a:prstGeom>
+        </p:spPr>
+        <p:style>
+          <a:lnRef idx="1">
+            <a:schemeClr val="accent1"/>
+          </a:lnRef>
+          <a:fillRef idx="2">
+            <a:schemeClr val="accent1"/>
+          </a:fillRef>
+          <a:effectRef idx="1">
+            <a:schemeClr val="accent1"/>
+          </a:effectRef>
+          <a:fontRef idx="minor">
+            <a:schemeClr val="dk1"/>
+          </a:fontRef>
+        </p:style>
+        <p:txBody>
+          <a:bodyPr rtlCol="0" anchor="ctr"/>
+          <a:lstStyle/>
+          <a:p>
+            <a:pPr algn="ctr"/>
+            <a:r>
+              <a:rPr lang="en-US" dirty="0" smtClean="0"/>
+              <a:t>4</a:t>
+            </a:r>
+            <a:endParaRPr lang="en-US" dirty="0"/>
+          </a:p>
+        </p:txBody>
+      </p:sp>
+      <p:sp>
+        <p:nvSpPr>
+          <p:cNvPr id="13" name="Rounded Rectangle 12"/>
+          <p:cNvSpPr/>
+          <p:nvPr/>
+        </p:nvSpPr>
+        <p:spPr>
+          <a:xfrm>
+            <a:off x="2743200" y="2053025"/>
+            <a:ext cx="5204298" cy="444855"/>
+          </a:xfrm>
+          <a:prstGeom prst="roundRect">
+            <a:avLst/>
+          </a:prstGeom>
+          <a:solidFill>
+            <a:schemeClr val="bg1">
+              <a:lumMod val="95000"/>
+            </a:schemeClr>
+          </a:solidFill>
+          <a:effectLst>
+            <a:innerShdw blurRad="63500" dist="50800" dir="8100000">
+              <a:prstClr val="black">
+                <a:alpha val="50000"/>
+              </a:prstClr>
+            </a:innerShdw>
+          </a:effectLst>
+        </p:spPr>
+        <p:style>
+          <a:lnRef idx="1">
+            <a:schemeClr val="accent1"/>
+          </a:lnRef>
+          <a:fillRef idx="2">
+            <a:schemeClr val="accent1"/>
+          </a:fillRef>
+          <a:effectRef idx="1">
+            <a:schemeClr val="accent1"/>
+          </a:effectRef>
+          <a:fontRef idx="minor">
+            <a:schemeClr val="dk1"/>
+          </a:fontRef>
+        </p:style>
+        <p:txBody>
+          <a:bodyPr rtlCol="0" anchor="ctr"/>
+          <a:lstStyle/>
+          <a:p>
+            <a:r>
+              <a:rPr lang="en-US" i="1" dirty="0" smtClean="0">
+                <a:solidFill>
+                  <a:schemeClr val="tx1"/>
+                </a:solidFill>
+              </a:rPr>
+              <a:t>Git Installation &amp; Configuration</a:t>
+            </a:r>
+            <a:endParaRPr lang="en-US" i="1" dirty="0">
+              <a:solidFill>
+                <a:schemeClr val="tx1"/>
+              </a:solidFill>
+            </a:endParaRPr>
+          </a:p>
+        </p:txBody>
+      </p:sp>
+      <p:sp>
+        <p:nvSpPr>
+          <p:cNvPr id="14" name="Oval 13"/>
+          <p:cNvSpPr/>
+          <p:nvPr/>
+        </p:nvSpPr>
+        <p:spPr>
+          <a:xfrm>
+            <a:off x="2071993" y="2051424"/>
+            <a:ext cx="486381" cy="448056"/>
+          </a:xfrm>
+          <a:prstGeom prst="ellipse">
+            <a:avLst/>
+          </a:prstGeom>
+        </p:spPr>
+        <p:style>
+          <a:lnRef idx="1">
+            <a:schemeClr val="accent1"/>
+          </a:lnRef>
+          <a:fillRef idx="2">
+            <a:schemeClr val="accent1"/>
+          </a:fillRef>
+          <a:effectRef idx="1">
+            <a:schemeClr val="accent1"/>
+          </a:effectRef>
+          <a:fontRef idx="minor">
+            <a:schemeClr val="dk1"/>
+          </a:fontRef>
+        </p:style>
+        <p:txBody>
+          <a:bodyPr rtlCol="0" anchor="ctr"/>
+          <a:lstStyle/>
+          <a:p>
+            <a:pPr algn="ctr"/>
+            <a:r>
+              <a:rPr lang="en-US" dirty="0" smtClean="0"/>
+              <a:t>2</a:t>
+            </a:r>
+            <a:endParaRPr lang="en-US" dirty="0"/>
+          </a:p>
+        </p:txBody>
+      </p:sp>
+      <p:sp>
+        <p:nvSpPr>
+          <p:cNvPr id="17" name="Slide Number Placeholder 16"/>
+          <p:cNvSpPr>
+            <a:spLocks noGrp="1"/>
+          </p:cNvSpPr>
+          <p:nvPr>
+            <p:ph type="sldNum" sz="quarter" idx="12"/>
+          </p:nvPr>
+        </p:nvSpPr>
+        <p:spPr/>
+        <p:txBody>
+          <a:bodyPr/>
+          <a:lstStyle/>
+          <a:p>
+            <a:fld id="{5353F4A8-CFD9-4FA7-984D-3FBCE02D5382}" type="slidenum">
+              <a:rPr lang="en-US" smtClean="0"/>
+              <a:t>2</a:t>
+            </a:fld>
+            <a:endParaRPr lang="en-US" dirty="0"/>
+          </a:p>
+        </p:txBody>
+      </p:sp>
+      <p:sp>
+        <p:nvSpPr>
+          <p:cNvPr id="18" name="Rounded Rectangle 17"/>
+          <p:cNvSpPr/>
+          <p:nvPr/>
+        </p:nvSpPr>
+        <p:spPr>
+          <a:xfrm>
+            <a:off x="2743200" y="4176962"/>
+            <a:ext cx="5204298" cy="444855"/>
+          </a:xfrm>
+          <a:prstGeom prst="roundRect">
+            <a:avLst/>
+          </a:prstGeom>
+          <a:solidFill>
+            <a:schemeClr val="bg1">
+              <a:lumMod val="95000"/>
+            </a:schemeClr>
+          </a:solidFill>
+          <a:effectLst>
+            <a:innerShdw blurRad="63500" dist="50800" dir="8100000">
+              <a:prstClr val="black">
+                <a:alpha val="50000"/>
+              </a:prstClr>
+            </a:innerShdw>
+          </a:effectLst>
+        </p:spPr>
+        <p:style>
+          <a:lnRef idx="1">
+            <a:schemeClr val="accent1"/>
+          </a:lnRef>
+          <a:fillRef idx="2">
+            <a:schemeClr val="accent1"/>
+          </a:fillRef>
+          <a:effectRef idx="1">
+            <a:schemeClr val="accent1"/>
+          </a:effectRef>
+          <a:fontRef idx="minor">
+            <a:schemeClr val="dk1"/>
+          </a:fontRef>
+        </p:style>
+        <p:txBody>
+          <a:bodyPr rtlCol="0" anchor="ctr"/>
+          <a:lstStyle/>
+          <a:p>
+            <a:r>
+              <a:rPr lang="en-US" i="1" dirty="0">
+                <a:solidFill>
+                  <a:schemeClr val="tx1"/>
+                </a:solidFill>
+              </a:rPr>
+              <a:t>GitHub.com</a:t>
+            </a:r>
+          </a:p>
+        </p:txBody>
+      </p:sp>
+      <p:sp>
+        <p:nvSpPr>
+          <p:cNvPr id="19" name="Oval 18"/>
+          <p:cNvSpPr/>
+          <p:nvPr/>
+        </p:nvSpPr>
+        <p:spPr>
+          <a:xfrm>
+            <a:off x="2071990" y="4176962"/>
+            <a:ext cx="486381" cy="448056"/>
+          </a:xfrm>
+          <a:prstGeom prst="ellipse">
+            <a:avLst/>
+          </a:prstGeom>
+        </p:spPr>
+        <p:style>
+          <a:lnRef idx="1">
+            <a:schemeClr val="accent1"/>
+          </a:lnRef>
+          <a:fillRef idx="2">
+            <a:schemeClr val="accent1"/>
+          </a:fillRef>
+          <a:effectRef idx="1">
+            <a:schemeClr val="accent1"/>
+          </a:effectRef>
+          <a:fontRef idx="minor">
+            <a:schemeClr val="dk1"/>
+          </a:fontRef>
+        </p:style>
+        <p:txBody>
+          <a:bodyPr rtlCol="0" anchor="ctr"/>
+          <a:lstStyle/>
+          <a:p>
+            <a:pPr algn="ctr"/>
+            <a:r>
+              <a:rPr lang="en-US" dirty="0"/>
+              <a:t>5</a:t>
+            </a:r>
+          </a:p>
+        </p:txBody>
+      </p:sp>
+      <p:sp>
+        <p:nvSpPr>
+          <p:cNvPr id="20" name="Rounded Rectangle 19"/>
+          <p:cNvSpPr/>
+          <p:nvPr/>
+        </p:nvSpPr>
+        <p:spPr>
+          <a:xfrm>
+            <a:off x="2743200" y="4886027"/>
+            <a:ext cx="5204298" cy="444855"/>
+          </a:xfrm>
+          <a:prstGeom prst="roundRect">
+            <a:avLst/>
+          </a:prstGeom>
+          <a:solidFill>
+            <a:schemeClr val="bg1">
+              <a:lumMod val="95000"/>
+            </a:schemeClr>
+          </a:solidFill>
+          <a:effectLst>
+            <a:innerShdw blurRad="63500" dist="50800" dir="8100000">
+              <a:prstClr val="black">
+                <a:alpha val="50000"/>
+              </a:prstClr>
+            </a:innerShdw>
+          </a:effectLst>
+        </p:spPr>
+        <p:style>
+          <a:lnRef idx="1">
+            <a:schemeClr val="accent1"/>
+          </a:lnRef>
+          <a:fillRef idx="2">
+            <a:schemeClr val="accent1"/>
+          </a:fillRef>
+          <a:effectRef idx="1">
+            <a:schemeClr val="accent1"/>
+          </a:effectRef>
+          <a:fontRef idx="minor">
+            <a:schemeClr val="dk1"/>
+          </a:fontRef>
+        </p:style>
+        <p:txBody>
+          <a:bodyPr rtlCol="0" anchor="ctr"/>
+          <a:lstStyle/>
+          <a:p>
+            <a:r>
+              <a:rPr lang="en-US" i="1" dirty="0" smtClean="0">
+                <a:solidFill>
+                  <a:schemeClr val="tx1"/>
+                </a:solidFill>
+              </a:rPr>
+              <a:t>Appendix</a:t>
+            </a:r>
+            <a:endParaRPr lang="en-US" i="1" dirty="0">
+              <a:solidFill>
+                <a:schemeClr val="tx1"/>
+              </a:solidFill>
+            </a:endParaRPr>
+          </a:p>
+        </p:txBody>
+      </p:sp>
+      <p:sp>
+        <p:nvSpPr>
+          <p:cNvPr id="21" name="Oval 20"/>
+          <p:cNvSpPr/>
+          <p:nvPr/>
+        </p:nvSpPr>
+        <p:spPr>
+          <a:xfrm>
+            <a:off x="2071990" y="4886027"/>
+            <a:ext cx="486381" cy="448056"/>
+          </a:xfrm>
+          <a:prstGeom prst="ellipse">
+            <a:avLst/>
+          </a:prstGeom>
+        </p:spPr>
+        <p:style>
+          <a:lnRef idx="1">
+            <a:schemeClr val="accent1"/>
+          </a:lnRef>
+          <a:fillRef idx="2">
+            <a:schemeClr val="accent1"/>
+          </a:fillRef>
+          <a:effectRef idx="1">
+            <a:schemeClr val="accent1"/>
+          </a:effectRef>
+          <a:fontRef idx="minor">
+            <a:schemeClr val="dk1"/>
+          </a:fontRef>
+        </p:style>
+        <p:txBody>
+          <a:bodyPr rtlCol="0" anchor="ctr"/>
+          <a:lstStyle/>
+          <a:p>
+            <a:pPr algn="ctr"/>
+            <a:r>
+              <a:rPr lang="en-US" dirty="0"/>
+              <a:t>6</a:t>
+            </a:r>
+          </a:p>
+        </p:txBody>
+      </p:sp>
+    </p:spTree>
+    <p:extLst>
+      <p:ext uri="{BB962C8B-B14F-4D97-AF65-F5344CB8AC3E}">
+        <p14:creationId xmlns:p14="http://schemas.microsoft.com/office/powerpoint/2010/main" val="1781340641"/>
+      </p:ext>
+    </p:extLst>
+  </p:cSld>
+  <p:clrMapOvr>
+    <a:masterClrMapping/>
+  </p:clrMapOvr>
+  <p:timing>
+    <p:tnLst>
+      <p:par>
+        <p:cTn id="1" dur="indefinite" restart="never" nodeType="tmRoot"/>
+      </p:par>
+    </p:tnLst>
+  </p:timing>
+</p:sld>
+</file>
+
+<file path=ppt/slides/slide20.xml><?xml version="1.0" encoding="utf-8"?>
 <p:sld xmlns:a="http://schemas.openxmlformats.org/drawingml/2006/main" xmlns:r="http://schemas.openxmlformats.org/officeDocument/2006/relationships" xmlns:p="http://schemas.openxmlformats.org/presentationml/2006/main">
   <p:cSld>
     <p:bg>
@@ -10571,7 +11824,7 @@
           <a:p>
             <a:fld id="{5353F4A8-CFD9-4FA7-984D-3FBCE02D5382}" type="slidenum">
               <a:rPr lang="en-US" smtClean="0"/>
-              <a:t>19</a:t>
+              <a:t>20</a:t>
             </a:fld>
             <a:endParaRPr lang="en-US" dirty="0"/>
           </a:p>
@@ -10597,799 +11850,7 @@
 </p:sld>
 </file>
 
-<file path=ppt/slides/slide2.xml><?xml version="1.0" encoding="utf-8"?>
-<p:sld xmlns:a="http://schemas.openxmlformats.org/drawingml/2006/main" xmlns:r="http://schemas.openxmlformats.org/officeDocument/2006/relationships" xmlns:p="http://schemas.openxmlformats.org/presentationml/2006/main">
-  <p:cSld>
-    <p:spTree>
-      <p:nvGrpSpPr>
-        <p:cNvPr id="1" name=""/>
-        <p:cNvGrpSpPr/>
-        <p:nvPr/>
-      </p:nvGrpSpPr>
-      <p:grpSpPr>
-        <a:xfrm>
-          <a:off x="0" y="0"/>
-          <a:ext cx="0" cy="0"/>
-          <a:chOff x="0" y="0"/>
-          <a:chExt cx="0" cy="0"/>
-        </a:xfrm>
-      </p:grpSpPr>
-      <p:sp>
-        <p:nvSpPr>
-          <p:cNvPr id="5" name="Footer Placeholder 4"/>
-          <p:cNvSpPr>
-            <a:spLocks noGrp="1"/>
-          </p:cNvSpPr>
-          <p:nvPr>
-            <p:ph type="ftr" sz="quarter" idx="11"/>
-          </p:nvPr>
-        </p:nvSpPr>
-        <p:spPr/>
-        <p:txBody>
-          <a:bodyPr/>
-          <a:lstStyle/>
-          <a:p>
-            <a:r>
-              <a:rPr lang="en-US" dirty="0" smtClean="0"/>
-              <a:t>PUBLIC</a:t>
-            </a:r>
-            <a:endParaRPr lang="en-US" dirty="0"/>
-          </a:p>
-        </p:txBody>
-      </p:sp>
-      <p:sp>
-        <p:nvSpPr>
-          <p:cNvPr id="4" name="TextBox 3"/>
-          <p:cNvSpPr txBox="1"/>
-          <p:nvPr/>
-        </p:nvSpPr>
-        <p:spPr>
-          <a:xfrm>
-            <a:off x="414779" y="160256"/>
-            <a:ext cx="11566689" cy="400110"/>
-          </a:xfrm>
-          <a:prstGeom prst="rect">
-            <a:avLst/>
-          </a:prstGeom>
-          <a:noFill/>
-        </p:spPr>
-        <p:txBody>
-          <a:bodyPr wrap="square" rtlCol="0">
-            <a:spAutoFit/>
-          </a:bodyPr>
-          <a:lstStyle/>
-          <a:p>
-            <a:r>
-              <a:rPr lang="en-US" sz="2000" i="1" dirty="0" smtClean="0">
-                <a:ln w="0"/>
-                <a:solidFill>
-                  <a:schemeClr val="accent1"/>
-                </a:solidFill>
-                <a:effectLst>
-                  <a:outerShdw blurRad="38100" dist="25400" dir="5400000" algn="ctr" rotWithShape="0">
-                    <a:srgbClr val="6E747A">
-                      <a:alpha val="43000"/>
-                    </a:srgbClr>
-                  </a:outerShdw>
-                </a:effectLst>
-              </a:rPr>
-              <a:t>  Table of Contents</a:t>
-            </a:r>
-            <a:endParaRPr lang="en-US" sz="2000" i="1" dirty="0">
-              <a:ln w="0"/>
-              <a:solidFill>
-                <a:schemeClr val="accent1"/>
-              </a:solidFill>
-              <a:effectLst>
-                <a:outerShdw blurRad="38100" dist="25400" dir="5400000" algn="ctr" rotWithShape="0">
-                  <a:srgbClr val="6E747A">
-                    <a:alpha val="43000"/>
-                  </a:srgbClr>
-                </a:outerShdw>
-              </a:effectLst>
-            </a:endParaRPr>
-          </a:p>
-        </p:txBody>
-      </p:sp>
-      <p:cxnSp>
-        <p:nvCxnSpPr>
-          <p:cNvPr id="6" name="Straight Connector 5"/>
-          <p:cNvCxnSpPr/>
-          <p:nvPr/>
-        </p:nvCxnSpPr>
-        <p:spPr>
-          <a:xfrm flipV="1">
-            <a:off x="547436" y="645998"/>
-            <a:ext cx="11244813" cy="9427"/>
-          </a:xfrm>
-          <a:prstGeom prst="line">
-            <a:avLst/>
-          </a:prstGeom>
-        </p:spPr>
-        <p:style>
-          <a:lnRef idx="3">
-            <a:schemeClr val="accent5"/>
-          </a:lnRef>
-          <a:fillRef idx="0">
-            <a:schemeClr val="accent5"/>
-          </a:fillRef>
-          <a:effectRef idx="2">
-            <a:schemeClr val="accent5"/>
-          </a:effectRef>
-          <a:fontRef idx="minor">
-            <a:schemeClr val="tx1"/>
-          </a:fontRef>
-        </p:style>
-      </p:cxnSp>
-      <p:sp>
-        <p:nvSpPr>
-          <p:cNvPr id="7" name="Rounded Rectangle 6"/>
-          <p:cNvSpPr/>
-          <p:nvPr/>
-        </p:nvSpPr>
-        <p:spPr>
-          <a:xfrm>
-            <a:off x="2743200" y="1364490"/>
-            <a:ext cx="5204298" cy="444855"/>
-          </a:xfrm>
-          <a:prstGeom prst="roundRect">
-            <a:avLst/>
-          </a:prstGeom>
-          <a:solidFill>
-            <a:schemeClr val="bg1">
-              <a:lumMod val="95000"/>
-            </a:schemeClr>
-          </a:solidFill>
-          <a:effectLst>
-            <a:innerShdw blurRad="63500" dist="50800" dir="8100000">
-              <a:prstClr val="black">
-                <a:alpha val="50000"/>
-              </a:prstClr>
-            </a:innerShdw>
-          </a:effectLst>
-        </p:spPr>
-        <p:style>
-          <a:lnRef idx="1">
-            <a:schemeClr val="accent1"/>
-          </a:lnRef>
-          <a:fillRef idx="2">
-            <a:schemeClr val="accent1"/>
-          </a:fillRef>
-          <a:effectRef idx="1">
-            <a:schemeClr val="accent1"/>
-          </a:effectRef>
-          <a:fontRef idx="minor">
-            <a:schemeClr val="dk1"/>
-          </a:fontRef>
-        </p:style>
-        <p:txBody>
-          <a:bodyPr rtlCol="0" anchor="ctr"/>
-          <a:lstStyle/>
-          <a:p>
-            <a:r>
-              <a:rPr lang="en-US" i="1" dirty="0" smtClean="0">
-                <a:solidFill>
-                  <a:schemeClr val="tx1"/>
-                </a:solidFill>
-              </a:rPr>
-              <a:t>Version Control System and </a:t>
-            </a:r>
-            <a:r>
-              <a:rPr lang="en-US" i="1" dirty="0" smtClean="0">
-                <a:solidFill>
-                  <a:schemeClr val="tx1"/>
-                </a:solidFill>
-              </a:rPr>
-              <a:t>Understanding Git</a:t>
-            </a:r>
-            <a:endParaRPr lang="en-US" i="1" dirty="0">
-              <a:solidFill>
-                <a:schemeClr val="tx1"/>
-              </a:solidFill>
-            </a:endParaRPr>
-          </a:p>
-        </p:txBody>
-      </p:sp>
-      <p:sp>
-        <p:nvSpPr>
-          <p:cNvPr id="8" name="Oval 7"/>
-          <p:cNvSpPr/>
-          <p:nvPr/>
-        </p:nvSpPr>
-        <p:spPr>
-          <a:xfrm>
-            <a:off x="2071993" y="1361289"/>
-            <a:ext cx="486381" cy="448056"/>
-          </a:xfrm>
-          <a:prstGeom prst="ellipse">
-            <a:avLst/>
-          </a:prstGeom>
-        </p:spPr>
-        <p:style>
-          <a:lnRef idx="1">
-            <a:schemeClr val="accent1"/>
-          </a:lnRef>
-          <a:fillRef idx="2">
-            <a:schemeClr val="accent1"/>
-          </a:fillRef>
-          <a:effectRef idx="1">
-            <a:schemeClr val="accent1"/>
-          </a:effectRef>
-          <a:fontRef idx="minor">
-            <a:schemeClr val="dk1"/>
-          </a:fontRef>
-        </p:style>
-        <p:txBody>
-          <a:bodyPr rtlCol="0" anchor="ctr"/>
-          <a:lstStyle/>
-          <a:p>
-            <a:pPr algn="ctr"/>
-            <a:r>
-              <a:rPr lang="en-US" dirty="0" smtClean="0"/>
-              <a:t>1</a:t>
-            </a:r>
-            <a:endParaRPr lang="en-US" dirty="0"/>
-          </a:p>
-        </p:txBody>
-      </p:sp>
-      <p:sp>
-        <p:nvSpPr>
-          <p:cNvPr id="9" name="Rounded Rectangle 8"/>
-          <p:cNvSpPr/>
-          <p:nvPr/>
-        </p:nvSpPr>
-        <p:spPr>
-          <a:xfrm>
-            <a:off x="2743200" y="3434894"/>
-            <a:ext cx="5204298" cy="444855"/>
-          </a:xfrm>
-          <a:prstGeom prst="roundRect">
-            <a:avLst/>
-          </a:prstGeom>
-          <a:solidFill>
-            <a:schemeClr val="bg1">
-              <a:lumMod val="95000"/>
-            </a:schemeClr>
-          </a:solidFill>
-          <a:effectLst>
-            <a:innerShdw blurRad="63500" dist="50800" dir="8100000">
-              <a:prstClr val="black">
-                <a:alpha val="50000"/>
-              </a:prstClr>
-            </a:innerShdw>
-          </a:effectLst>
-        </p:spPr>
-        <p:style>
-          <a:lnRef idx="1">
-            <a:schemeClr val="accent1"/>
-          </a:lnRef>
-          <a:fillRef idx="2">
-            <a:schemeClr val="accent1"/>
-          </a:fillRef>
-          <a:effectRef idx="1">
-            <a:schemeClr val="accent1"/>
-          </a:effectRef>
-          <a:fontRef idx="minor">
-            <a:schemeClr val="dk1"/>
-          </a:fontRef>
-        </p:style>
-        <p:txBody>
-          <a:bodyPr rtlCol="0" anchor="ctr"/>
-          <a:lstStyle/>
-          <a:p>
-            <a:r>
-              <a:rPr lang="en-US" i="1" dirty="0" smtClean="0">
-                <a:solidFill>
-                  <a:schemeClr val="tx1"/>
-                </a:solidFill>
-              </a:rPr>
-              <a:t>GitHub Desktop</a:t>
-            </a:r>
-            <a:endParaRPr lang="en-US" i="1" dirty="0">
-              <a:solidFill>
-                <a:schemeClr val="tx1"/>
-              </a:solidFill>
-            </a:endParaRPr>
-          </a:p>
-        </p:txBody>
-      </p:sp>
-      <p:sp>
-        <p:nvSpPr>
-          <p:cNvPr id="10" name="Oval 9"/>
-          <p:cNvSpPr/>
-          <p:nvPr/>
-        </p:nvSpPr>
-        <p:spPr>
-          <a:xfrm>
-            <a:off x="2071991" y="2741559"/>
-            <a:ext cx="486381" cy="448056"/>
-          </a:xfrm>
-          <a:prstGeom prst="ellipse">
-            <a:avLst/>
-          </a:prstGeom>
-        </p:spPr>
-        <p:style>
-          <a:lnRef idx="1">
-            <a:schemeClr val="accent1"/>
-          </a:lnRef>
-          <a:fillRef idx="2">
-            <a:schemeClr val="accent1"/>
-          </a:fillRef>
-          <a:effectRef idx="1">
-            <a:schemeClr val="accent1"/>
-          </a:effectRef>
-          <a:fontRef idx="minor">
-            <a:schemeClr val="dk1"/>
-          </a:fontRef>
-        </p:style>
-        <p:txBody>
-          <a:bodyPr rtlCol="0" anchor="ctr"/>
-          <a:lstStyle/>
-          <a:p>
-            <a:pPr algn="ctr"/>
-            <a:r>
-              <a:rPr lang="en-US" dirty="0"/>
-              <a:t>3</a:t>
-            </a:r>
-          </a:p>
-        </p:txBody>
-      </p:sp>
-      <p:sp>
-        <p:nvSpPr>
-          <p:cNvPr id="11" name="Rounded Rectangle 10"/>
-          <p:cNvSpPr/>
-          <p:nvPr/>
-        </p:nvSpPr>
-        <p:spPr>
-          <a:xfrm>
-            <a:off x="2743200" y="2744760"/>
-            <a:ext cx="5204298" cy="444855"/>
-          </a:xfrm>
-          <a:prstGeom prst="roundRect">
-            <a:avLst/>
-          </a:prstGeom>
-          <a:solidFill>
-            <a:schemeClr val="bg1">
-              <a:lumMod val="95000"/>
-            </a:schemeClr>
-          </a:solidFill>
-          <a:effectLst>
-            <a:innerShdw blurRad="63500" dist="50800" dir="8100000">
-              <a:prstClr val="black">
-                <a:alpha val="50000"/>
-              </a:prstClr>
-            </a:innerShdw>
-          </a:effectLst>
-        </p:spPr>
-        <p:style>
-          <a:lnRef idx="1">
-            <a:schemeClr val="accent1"/>
-          </a:lnRef>
-          <a:fillRef idx="2">
-            <a:schemeClr val="accent1"/>
-          </a:fillRef>
-          <a:effectRef idx="1">
-            <a:schemeClr val="accent1"/>
-          </a:effectRef>
-          <a:fontRef idx="minor">
-            <a:schemeClr val="dk1"/>
-          </a:fontRef>
-        </p:style>
-        <p:txBody>
-          <a:bodyPr rtlCol="0" anchor="ctr"/>
-          <a:lstStyle/>
-          <a:p>
-            <a:r>
-              <a:rPr lang="en-US" i="1" dirty="0" smtClean="0">
-                <a:solidFill>
-                  <a:schemeClr val="tx1"/>
-                </a:solidFill>
-              </a:rPr>
-              <a:t>Git Command Line operation</a:t>
-            </a:r>
-            <a:endParaRPr lang="en-US" i="1" dirty="0">
-              <a:solidFill>
-                <a:schemeClr val="tx1"/>
-              </a:solidFill>
-            </a:endParaRPr>
-          </a:p>
-        </p:txBody>
-      </p:sp>
-      <p:sp>
-        <p:nvSpPr>
-          <p:cNvPr id="12" name="Oval 11"/>
-          <p:cNvSpPr/>
-          <p:nvPr/>
-        </p:nvSpPr>
-        <p:spPr>
-          <a:xfrm>
-            <a:off x="2071992" y="3431693"/>
-            <a:ext cx="486381" cy="448056"/>
-          </a:xfrm>
-          <a:prstGeom prst="ellipse">
-            <a:avLst/>
-          </a:prstGeom>
-        </p:spPr>
-        <p:style>
-          <a:lnRef idx="1">
-            <a:schemeClr val="accent1"/>
-          </a:lnRef>
-          <a:fillRef idx="2">
-            <a:schemeClr val="accent1"/>
-          </a:fillRef>
-          <a:effectRef idx="1">
-            <a:schemeClr val="accent1"/>
-          </a:effectRef>
-          <a:fontRef idx="minor">
-            <a:schemeClr val="dk1"/>
-          </a:fontRef>
-        </p:style>
-        <p:txBody>
-          <a:bodyPr rtlCol="0" anchor="ctr"/>
-          <a:lstStyle/>
-          <a:p>
-            <a:pPr algn="ctr"/>
-            <a:r>
-              <a:rPr lang="en-US" dirty="0" smtClean="0"/>
-              <a:t>4</a:t>
-            </a:r>
-            <a:endParaRPr lang="en-US" dirty="0"/>
-          </a:p>
-        </p:txBody>
-      </p:sp>
-      <p:sp>
-        <p:nvSpPr>
-          <p:cNvPr id="13" name="Rounded Rectangle 12"/>
-          <p:cNvSpPr/>
-          <p:nvPr/>
-        </p:nvSpPr>
-        <p:spPr>
-          <a:xfrm>
-            <a:off x="2743200" y="2053025"/>
-            <a:ext cx="5204298" cy="444855"/>
-          </a:xfrm>
-          <a:prstGeom prst="roundRect">
-            <a:avLst/>
-          </a:prstGeom>
-          <a:solidFill>
-            <a:schemeClr val="bg1">
-              <a:lumMod val="95000"/>
-            </a:schemeClr>
-          </a:solidFill>
-          <a:effectLst>
-            <a:innerShdw blurRad="63500" dist="50800" dir="8100000">
-              <a:prstClr val="black">
-                <a:alpha val="50000"/>
-              </a:prstClr>
-            </a:innerShdw>
-          </a:effectLst>
-        </p:spPr>
-        <p:style>
-          <a:lnRef idx="1">
-            <a:schemeClr val="accent1"/>
-          </a:lnRef>
-          <a:fillRef idx="2">
-            <a:schemeClr val="accent1"/>
-          </a:fillRef>
-          <a:effectRef idx="1">
-            <a:schemeClr val="accent1"/>
-          </a:effectRef>
-          <a:fontRef idx="minor">
-            <a:schemeClr val="dk1"/>
-          </a:fontRef>
-        </p:style>
-        <p:txBody>
-          <a:bodyPr rtlCol="0" anchor="ctr"/>
-          <a:lstStyle/>
-          <a:p>
-            <a:r>
-              <a:rPr lang="en-US" i="1" dirty="0" smtClean="0">
-                <a:solidFill>
-                  <a:schemeClr val="tx1"/>
-                </a:solidFill>
-              </a:rPr>
-              <a:t>Git Installation &amp; Configuration</a:t>
-            </a:r>
-            <a:endParaRPr lang="en-US" i="1" dirty="0">
-              <a:solidFill>
-                <a:schemeClr val="tx1"/>
-              </a:solidFill>
-            </a:endParaRPr>
-          </a:p>
-        </p:txBody>
-      </p:sp>
-      <p:sp>
-        <p:nvSpPr>
-          <p:cNvPr id="14" name="Oval 13"/>
-          <p:cNvSpPr/>
-          <p:nvPr/>
-        </p:nvSpPr>
-        <p:spPr>
-          <a:xfrm>
-            <a:off x="2071993" y="2051424"/>
-            <a:ext cx="486381" cy="448056"/>
-          </a:xfrm>
-          <a:prstGeom prst="ellipse">
-            <a:avLst/>
-          </a:prstGeom>
-        </p:spPr>
-        <p:style>
-          <a:lnRef idx="1">
-            <a:schemeClr val="accent1"/>
-          </a:lnRef>
-          <a:fillRef idx="2">
-            <a:schemeClr val="accent1"/>
-          </a:fillRef>
-          <a:effectRef idx="1">
-            <a:schemeClr val="accent1"/>
-          </a:effectRef>
-          <a:fontRef idx="minor">
-            <a:schemeClr val="dk1"/>
-          </a:fontRef>
-        </p:style>
-        <p:txBody>
-          <a:bodyPr rtlCol="0" anchor="ctr"/>
-          <a:lstStyle/>
-          <a:p>
-            <a:pPr algn="ctr"/>
-            <a:r>
-              <a:rPr lang="en-US" dirty="0" smtClean="0"/>
-              <a:t>2</a:t>
-            </a:r>
-            <a:endParaRPr lang="en-US" dirty="0"/>
-          </a:p>
-        </p:txBody>
-      </p:sp>
-      <p:sp>
-        <p:nvSpPr>
-          <p:cNvPr id="17" name="Slide Number Placeholder 16"/>
-          <p:cNvSpPr>
-            <a:spLocks noGrp="1"/>
-          </p:cNvSpPr>
-          <p:nvPr>
-            <p:ph type="sldNum" sz="quarter" idx="12"/>
-          </p:nvPr>
-        </p:nvSpPr>
-        <p:spPr/>
-        <p:txBody>
-          <a:bodyPr/>
-          <a:lstStyle/>
-          <a:p>
-            <a:fld id="{5353F4A8-CFD9-4FA7-984D-3FBCE02D5382}" type="slidenum">
-              <a:rPr lang="en-US" smtClean="0"/>
-              <a:t>2</a:t>
-            </a:fld>
-            <a:endParaRPr lang="en-US" dirty="0"/>
-          </a:p>
-        </p:txBody>
-      </p:sp>
-      <p:sp>
-        <p:nvSpPr>
-          <p:cNvPr id="18" name="Rounded Rectangle 17"/>
-          <p:cNvSpPr/>
-          <p:nvPr/>
-        </p:nvSpPr>
-        <p:spPr>
-          <a:xfrm>
-            <a:off x="2743200" y="4176962"/>
-            <a:ext cx="5204298" cy="444855"/>
-          </a:xfrm>
-          <a:prstGeom prst="roundRect">
-            <a:avLst/>
-          </a:prstGeom>
-          <a:solidFill>
-            <a:schemeClr val="bg1">
-              <a:lumMod val="95000"/>
-            </a:schemeClr>
-          </a:solidFill>
-          <a:effectLst>
-            <a:innerShdw blurRad="63500" dist="50800" dir="8100000">
-              <a:prstClr val="black">
-                <a:alpha val="50000"/>
-              </a:prstClr>
-            </a:innerShdw>
-          </a:effectLst>
-        </p:spPr>
-        <p:style>
-          <a:lnRef idx="1">
-            <a:schemeClr val="accent1"/>
-          </a:lnRef>
-          <a:fillRef idx="2">
-            <a:schemeClr val="accent1"/>
-          </a:fillRef>
-          <a:effectRef idx="1">
-            <a:schemeClr val="accent1"/>
-          </a:effectRef>
-          <a:fontRef idx="minor">
-            <a:schemeClr val="dk1"/>
-          </a:fontRef>
-        </p:style>
-        <p:txBody>
-          <a:bodyPr rtlCol="0" anchor="ctr"/>
-          <a:lstStyle/>
-          <a:p>
-            <a:r>
-              <a:rPr lang="en-US" i="1">
-                <a:solidFill>
-                  <a:schemeClr val="tx1"/>
-                </a:solidFill>
-              </a:rPr>
-              <a:t>GitHub.com</a:t>
-            </a:r>
-            <a:endParaRPr lang="en-US" i="1" dirty="0">
-              <a:solidFill>
-                <a:schemeClr val="tx1"/>
-              </a:solidFill>
-            </a:endParaRPr>
-          </a:p>
-        </p:txBody>
-      </p:sp>
-      <p:sp>
-        <p:nvSpPr>
-          <p:cNvPr id="19" name="Oval 18"/>
-          <p:cNvSpPr/>
-          <p:nvPr/>
-        </p:nvSpPr>
-        <p:spPr>
-          <a:xfrm>
-            <a:off x="2071990" y="4176962"/>
-            <a:ext cx="486381" cy="448056"/>
-          </a:xfrm>
-          <a:prstGeom prst="ellipse">
-            <a:avLst/>
-          </a:prstGeom>
-        </p:spPr>
-        <p:style>
-          <a:lnRef idx="1">
-            <a:schemeClr val="accent1"/>
-          </a:lnRef>
-          <a:fillRef idx="2">
-            <a:schemeClr val="accent1"/>
-          </a:fillRef>
-          <a:effectRef idx="1">
-            <a:schemeClr val="accent1"/>
-          </a:effectRef>
-          <a:fontRef idx="minor">
-            <a:schemeClr val="dk1"/>
-          </a:fontRef>
-        </p:style>
-        <p:txBody>
-          <a:bodyPr rtlCol="0" anchor="ctr"/>
-          <a:lstStyle/>
-          <a:p>
-            <a:pPr algn="ctr"/>
-            <a:r>
-              <a:rPr lang="en-US" dirty="0"/>
-              <a:t>5</a:t>
-            </a:r>
-            <a:endParaRPr lang="en-US" dirty="0"/>
-          </a:p>
-        </p:txBody>
-      </p:sp>
-      <p:sp>
-        <p:nvSpPr>
-          <p:cNvPr id="20" name="Rounded Rectangle 19"/>
-          <p:cNvSpPr/>
-          <p:nvPr/>
-        </p:nvSpPr>
-        <p:spPr>
-          <a:xfrm>
-            <a:off x="2743200" y="4886027"/>
-            <a:ext cx="5204298" cy="444855"/>
-          </a:xfrm>
-          <a:prstGeom prst="roundRect">
-            <a:avLst/>
-          </a:prstGeom>
-          <a:solidFill>
-            <a:schemeClr val="bg1">
-              <a:lumMod val="95000"/>
-            </a:schemeClr>
-          </a:solidFill>
-          <a:effectLst>
-            <a:innerShdw blurRad="63500" dist="50800" dir="8100000">
-              <a:prstClr val="black">
-                <a:alpha val="50000"/>
-              </a:prstClr>
-            </a:innerShdw>
-          </a:effectLst>
-        </p:spPr>
-        <p:style>
-          <a:lnRef idx="1">
-            <a:schemeClr val="accent1"/>
-          </a:lnRef>
-          <a:fillRef idx="2">
-            <a:schemeClr val="accent1"/>
-          </a:fillRef>
-          <a:effectRef idx="1">
-            <a:schemeClr val="accent1"/>
-          </a:effectRef>
-          <a:fontRef idx="minor">
-            <a:schemeClr val="dk1"/>
-          </a:fontRef>
-        </p:style>
-        <p:txBody>
-          <a:bodyPr rtlCol="0" anchor="ctr"/>
-          <a:lstStyle/>
-          <a:p>
-            <a:r>
-              <a:rPr lang="en-US" i="1" dirty="0" smtClean="0">
-                <a:solidFill>
-                  <a:schemeClr val="tx1"/>
-                </a:solidFill>
-              </a:rPr>
-              <a:t>Appendix</a:t>
-            </a:r>
-            <a:endParaRPr lang="en-US" i="1" dirty="0">
-              <a:solidFill>
-                <a:schemeClr val="tx1"/>
-              </a:solidFill>
-            </a:endParaRPr>
-          </a:p>
-        </p:txBody>
-      </p:sp>
-      <p:sp>
-        <p:nvSpPr>
-          <p:cNvPr id="21" name="Oval 20"/>
-          <p:cNvSpPr/>
-          <p:nvPr/>
-        </p:nvSpPr>
-        <p:spPr>
-          <a:xfrm>
-            <a:off x="2071990" y="4886027"/>
-            <a:ext cx="486381" cy="448056"/>
-          </a:xfrm>
-          <a:prstGeom prst="ellipse">
-            <a:avLst/>
-          </a:prstGeom>
-        </p:spPr>
-        <p:style>
-          <a:lnRef idx="1">
-            <a:schemeClr val="accent1"/>
-          </a:lnRef>
-          <a:fillRef idx="2">
-            <a:schemeClr val="accent1"/>
-          </a:fillRef>
-          <a:effectRef idx="1">
-            <a:schemeClr val="accent1"/>
-          </a:effectRef>
-          <a:fontRef idx="minor">
-            <a:schemeClr val="dk1"/>
-          </a:fontRef>
-        </p:style>
-        <p:txBody>
-          <a:bodyPr rtlCol="0" anchor="ctr"/>
-          <a:lstStyle/>
-          <a:p>
-            <a:pPr algn="ctr"/>
-            <a:r>
-              <a:rPr lang="en-US" dirty="0"/>
-              <a:t>6</a:t>
-            </a:r>
-            <a:endParaRPr lang="en-US" dirty="0"/>
-          </a:p>
-        </p:txBody>
-      </p:sp>
-    </p:spTree>
-    <p:extLst>
-      <p:ext uri="{BB962C8B-B14F-4D97-AF65-F5344CB8AC3E}">
-        <p14:creationId xmlns:p14="http://schemas.microsoft.com/office/powerpoint/2010/main" val="1781340641"/>
-      </p:ext>
-    </p:extLst>
-  </p:cSld>
-  <p:clrMapOvr>
-    <a:masterClrMapping/>
-  </p:clrMapOvr>
-  <p:timing>
-    <p:tnLst>
-      <p:par>
-        <p:cTn id="1" dur="indefinite" restart="never" nodeType="tmRoot"/>
-      </p:par>
-    </p:tnLst>
-  </p:timing>
-</p:sld>
-</file>
-
-<file path=ppt/slides/slide20.xml><?xml version="1.0" encoding="utf-8"?>
+<file path=ppt/slides/slide21.xml><?xml version="1.0" encoding="utf-8"?>
 <p:sld xmlns:a="http://schemas.openxmlformats.org/drawingml/2006/main" xmlns:r="http://schemas.openxmlformats.org/officeDocument/2006/relationships" xmlns:p="http://schemas.openxmlformats.org/presentationml/2006/main">
   <p:cSld>
     <p:spTree>
@@ -11422,7 +11883,7 @@
           <a:lstStyle/>
           <a:p>
             <a:r>
-              <a:rPr lang="en-US" smtClean="0"/>
+              <a:rPr lang="en-US" dirty="0" smtClean="0"/>
               <a:t>PUBLIC</a:t>
             </a:r>
             <a:endParaRPr lang="en-US" dirty="0"/>
@@ -11465,23 +11926,7 @@
                   </a:outerShdw>
                 </a:effectLst>
               </a:rPr>
-              <a:t>    </a:t>
-            </a:r>
-            <a:r>
-              <a:rPr lang="en-US" sz="2000" i="1" dirty="0" smtClean="0">
-                <a:ln w="0"/>
-                <a:solidFill>
-                  <a:schemeClr val="accent1"/>
-                </a:solidFill>
-                <a:effectLst>
-                  <a:outerShdw blurRad="38100" dist="25400" dir="5400000" algn="ctr" rotWithShape="0">
-                    <a:srgbClr val="6E747A">
-                      <a:alpha val="43000"/>
-                    </a:srgbClr>
-                  </a:outerShdw>
-                </a:effectLst>
-              </a:rPr>
-              <a:t>GitHub Desktop</a:t>
+              <a:t>    GitHub Desktop</a:t>
             </a:r>
             <a:endParaRPr lang="en-US" sz="2000" i="1" dirty="0">
               <a:ln w="0"/>
@@ -12566,7 +13011,7 @@
 </p:sld>
 </file>
 
-<file path=ppt/slides/slide21.xml><?xml version="1.0" encoding="utf-8"?>
+<file path=ppt/slides/slide22.xml><?xml version="1.0" encoding="utf-8"?>
 <p:sld xmlns:a="http://schemas.openxmlformats.org/drawingml/2006/main" xmlns:r="http://schemas.openxmlformats.org/officeDocument/2006/relationships" xmlns:p="http://schemas.openxmlformats.org/presentationml/2006/main">
   <p:cSld>
     <p:spTree>
@@ -12599,7 +13044,7 @@
           <a:lstStyle/>
           <a:p>
             <a:r>
-              <a:rPr lang="en-US" smtClean="0"/>
+              <a:rPr lang="en-US" dirty="0" smtClean="0"/>
               <a:t>PUBLIC</a:t>
             </a:r>
             <a:endParaRPr lang="en-US" dirty="0"/>
@@ -13241,23 +13686,7 @@
                   </a:outerShdw>
                 </a:effectLst>
               </a:rPr>
-              <a:t>    </a:t>
-            </a:r>
-            <a:r>
-              <a:rPr lang="en-US" sz="2000" i="1" dirty="0" smtClean="0">
-                <a:ln w="0"/>
-                <a:solidFill>
-                  <a:schemeClr val="accent1"/>
-                </a:solidFill>
-                <a:effectLst>
-                  <a:outerShdw blurRad="38100" dist="25400" dir="5400000" algn="ctr" rotWithShape="0">
-                    <a:srgbClr val="6E747A">
-                      <a:alpha val="43000"/>
-                    </a:srgbClr>
-                  </a:outerShdw>
-                </a:effectLst>
-              </a:rPr>
-              <a:t>GitHub Desktop Continued…</a:t>
+              <a:t>    GitHub Desktop Continued…</a:t>
             </a:r>
             <a:endParaRPr lang="en-US" sz="2000" i="1" dirty="0">
               <a:ln w="0"/>
@@ -13288,7 +13717,7 @@
 </p:sld>
 </file>
 
-<file path=ppt/slides/slide22.xml><?xml version="1.0" encoding="utf-8"?>
+<file path=ppt/slides/slide23.xml><?xml version="1.0" encoding="utf-8"?>
 <p:sld xmlns:a="http://schemas.openxmlformats.org/drawingml/2006/main" xmlns:r="http://schemas.openxmlformats.org/officeDocument/2006/relationships" xmlns:p="http://schemas.openxmlformats.org/presentationml/2006/main">
   <p:cSld>
     <p:bg>
@@ -13567,7 +13996,7 @@
           <a:p>
             <a:fld id="{5353F4A8-CFD9-4FA7-984D-3FBCE02D5382}" type="slidenum">
               <a:rPr lang="en-US" smtClean="0"/>
-              <a:t>22</a:t>
+              <a:t>23</a:t>
             </a:fld>
             <a:endParaRPr lang="en-US" dirty="0"/>
           </a:p>
@@ -13593,7 +14022,7 @@
 </p:sld>
 </file>
 
-<file path=ppt/slides/slide23.xml><?xml version="1.0" encoding="utf-8"?>
+<file path=ppt/slides/slide24.xml><?xml version="1.0" encoding="utf-8"?>
 <p:sld xmlns:a="http://schemas.openxmlformats.org/drawingml/2006/main" xmlns:r="http://schemas.openxmlformats.org/officeDocument/2006/relationships" xmlns:p="http://schemas.openxmlformats.org/presentationml/2006/main">
   <p:cSld>
     <p:spTree>
@@ -13676,23 +14105,7 @@
                   </a:outerShdw>
                 </a:effectLst>
               </a:rPr>
-              <a:t>    </a:t>
-            </a:r>
-            <a:r>
-              <a:rPr lang="en-US" sz="2000" i="1" dirty="0" smtClean="0">
-                <a:ln w="0"/>
-                <a:solidFill>
-                  <a:schemeClr val="accent1"/>
-                </a:solidFill>
-                <a:effectLst>
-                  <a:outerShdw blurRad="38100" dist="25400" dir="5400000" algn="ctr" rotWithShape="0">
-                    <a:srgbClr val="6E747A">
-                      <a:alpha val="43000"/>
-                    </a:srgbClr>
-                  </a:outerShdw>
-                </a:effectLst>
-              </a:rPr>
-              <a:t>What is GitHub ?</a:t>
+              <a:t>    What is GitHub ?</a:t>
             </a:r>
             <a:endParaRPr lang="en-US" sz="2000" i="1" dirty="0">
               <a:ln w="0"/>
@@ -13844,16 +14257,7 @@
                 </a:solidFill>
                 <a:latin typeface="+mj-lt"/>
               </a:rPr>
-              <a:t>“Forking” is when you create a new project based off of another project that already exists. If you find a project on GitHub that you’d like to contribute to, you can fork the repo, make the changes you’d like, and release the revised project as a new repo. </a:t>
-            </a:r>
-            <a:r>
-              <a:rPr lang="en-US" sz="1400" i="1" dirty="0">
-                <a:solidFill>
-                  <a:srgbClr val="000000"/>
-                </a:solidFill>
-                <a:latin typeface="+mj-lt"/>
-              </a:rPr>
-              <a:t>If the original repository that you forked to create your new project gets updated, you can easily add those updates to your current fork</a:t>
+              <a:t>“Forking” is when you create a new project based off of another project that already exists. If you find a project on GitHub that you’d like to contribute to, you can fork the repo, make the changes you’d like, and release the revised project as a new repo. If the original repository that you forked to create your new project gets updated, you can easily add those updates to your current fork</a:t>
             </a:r>
             <a:r>
               <a:rPr lang="en-US" sz="1400" i="1" dirty="0" smtClean="0">
@@ -13895,16 +14299,7 @@
                 </a:solidFill>
                 <a:latin typeface="+mj-lt"/>
               </a:rPr>
-              <a:t>You fork a repository, make a great revision to the project, and want it to be recognized by the original developers, maybe even included in the official project/repository. You can do so by creating a pull request, so the authors of the original repository can see your work, and then choose whether or not to accept it into the official project. </a:t>
-            </a:r>
-            <a:r>
-              <a:rPr lang="en-US" sz="1400" i="1" dirty="0">
-                <a:solidFill>
-                  <a:srgbClr val="000000"/>
-                </a:solidFill>
-                <a:latin typeface="+mj-lt"/>
-              </a:rPr>
-              <a:t>Whenever you issue a pull request, GitHub provides a perfect medium for you and the project’s maintainer to </a:t>
+              <a:t>You fork a repository, make a great revision to the project, and want it to be recognized by the original developers, maybe even included in the official project/repository. You can do so by creating a pull request, so the authors of the original repository can see your work, and then choose whether or not to accept it into the official project. Whenever you issue a pull request, GitHub provides a perfect medium for you and the project’s maintainer to </a:t>
             </a:r>
             <a:r>
               <a:rPr lang="en-US" sz="1400" i="1" dirty="0" smtClean="0">
@@ -13940,16 +14335,7 @@
                 </a:solidFill>
                 <a:latin typeface="+mj-lt"/>
               </a:rPr>
-              <a:t>Social </a:t>
-            </a:r>
-            <a:r>
-              <a:rPr lang="en-US" sz="1400" b="1" i="1" dirty="0">
-                <a:solidFill>
-                  <a:srgbClr val="000000"/>
-                </a:solidFill>
-                <a:latin typeface="+mj-lt"/>
-              </a:rPr>
-              <a:t>networking</a:t>
+              <a:t>Social networking</a:t>
             </a:r>
             <a:r>
               <a:rPr lang="en-US" sz="1400" b="1" i="1" dirty="0" smtClean="0">
@@ -13967,16 +14353,7 @@
                 </a:solidFill>
                 <a:latin typeface="+mj-lt"/>
               </a:rPr>
-              <a:t>The social networking aspect of GitHub is probably its most powerful feature, and is what allows projects to grow more than anything else. </a:t>
-            </a:r>
-            <a:r>
-              <a:rPr lang="en-US" sz="1400" i="1" dirty="0">
-                <a:solidFill>
-                  <a:srgbClr val="000000"/>
-                </a:solidFill>
-                <a:latin typeface="+mj-lt"/>
-              </a:rPr>
-              <a:t>Each user on GitHub has their own profile, which can act like a resume of sorts, showing your past work and contributions to other projects via pull </a:t>
+              <a:t>The social networking aspect of GitHub is probably its most powerful feature, and is what allows projects to grow more than anything else. Each user on GitHub has their own profile, which can act like a resume of sorts, showing your past work and contributions to other projects via pull </a:t>
             </a:r>
             <a:r>
               <a:rPr lang="en-US" sz="1400" i="1" dirty="0" smtClean="0">
@@ -14035,16 +14412,7 @@
                 </a:solidFill>
                 <a:latin typeface="+mj-lt"/>
               </a:rPr>
-              <a:t>When </a:t>
-            </a:r>
-            <a:r>
-              <a:rPr lang="en-US" sz="1400" i="1" dirty="0">
-                <a:solidFill>
-                  <a:srgbClr val="000000"/>
-                </a:solidFill>
-                <a:latin typeface="+mj-lt"/>
-              </a:rPr>
-              <a:t>multiple people are collaborating on a project, it’s really hard to keep track of who changed what, and to keep track of the revisions that took place. GitHub takes care of this problem by keeping track of all the changes that have been pushed to the repository.</a:t>
+              <a:t>When multiple people are collaborating on a project, it’s really hard to keep track of who changed what, and to keep track of the revisions that took place. GitHub takes care of this problem by keeping track of all the changes that have been pushed to the repository.</a:t>
             </a:r>
           </a:p>
           <a:p>
@@ -14146,7 +14514,7 @@
           <a:lstStyle/>
           <a:p>
             <a:r>
-              <a:rPr lang="en-US" smtClean="0"/>
+              <a:rPr lang="en-US" dirty="0" smtClean="0"/>
               <a:t>PUBLIC</a:t>
             </a:r>
             <a:endParaRPr lang="en-US" dirty="0"/>
@@ -14166,7 +14534,7 @@
 </p:sld>
 </file>
 
-<file path=ppt/slides/slide24.xml><?xml version="1.0" encoding="utf-8"?>
+<file path=ppt/slides/slide25.xml><?xml version="1.0" encoding="utf-8"?>
 <p:sld xmlns:a="http://schemas.openxmlformats.org/drawingml/2006/main" xmlns:r="http://schemas.openxmlformats.org/officeDocument/2006/relationships" xmlns:p="http://schemas.openxmlformats.org/presentationml/2006/main">
   <p:cSld>
     <p:bg>
@@ -14573,7 +14941,7 @@
           <a:p>
             <a:fld id="{5353F4A8-CFD9-4FA7-984D-3FBCE02D5382}" type="slidenum">
               <a:rPr lang="en-US" smtClean="0"/>
-              <a:t>24</a:t>
+              <a:t>25</a:t>
             </a:fld>
             <a:endParaRPr lang="en-US" dirty="0"/>
           </a:p>
@@ -14599,7 +14967,7 @@
 </p:sld>
 </file>
 
-<file path=ppt/slides/slide25.xml><?xml version="1.0" encoding="utf-8"?>
+<file path=ppt/slides/slide26.xml><?xml version="1.0" encoding="utf-8"?>
 <p:sld xmlns:a="http://schemas.openxmlformats.org/drawingml/2006/main" xmlns:r="http://schemas.openxmlformats.org/officeDocument/2006/relationships" xmlns:p="http://schemas.openxmlformats.org/presentationml/2006/main">
   <p:cSld>
     <p:spTree>
@@ -14652,23 +15020,7 @@
                   </a:outerShdw>
                 </a:effectLst>
               </a:rPr>
-              <a:t>   </a:t>
-            </a:r>
-            <a:r>
-              <a:rPr lang="en-US" sz="2000" i="1" dirty="0" smtClean="0">
-                <a:ln w="0"/>
-                <a:solidFill>
-                  <a:schemeClr val="accent1"/>
-                </a:solidFill>
-                <a:effectLst>
-                  <a:outerShdw blurRad="38100" dist="25400" dir="5400000" algn="ctr" rotWithShape="0">
-                    <a:srgbClr val="6E747A">
-                      <a:alpha val="43000"/>
-                    </a:srgbClr>
-                  </a:outerShdw>
-                </a:effectLst>
-              </a:rPr>
-              <a:t>GitHub Desktop Authentication</a:t>
+              <a:t>   GitHub Desktop Authentication</a:t>
             </a:r>
             <a:endParaRPr lang="en-US" sz="2000" i="1" dirty="0">
               <a:ln w="0"/>
@@ -15220,7 +15572,7 @@
           <a:lstStyle/>
           <a:p>
             <a:r>
-              <a:rPr lang="en-US" smtClean="0"/>
+              <a:rPr lang="en-US" dirty="0" smtClean="0"/>
               <a:t>PUBLIC</a:t>
             </a:r>
             <a:endParaRPr lang="en-US" dirty="0"/>
@@ -15291,7 +15643,7 @@
 </p:sld>
 </file>
 
-<file path=ppt/slides/slide26.xml><?xml version="1.0" encoding="utf-8"?>
+<file path=ppt/slides/slide27.xml><?xml version="1.0" encoding="utf-8"?>
 <p:sld xmlns:a="http://schemas.openxmlformats.org/drawingml/2006/main" xmlns:r="http://schemas.openxmlformats.org/officeDocument/2006/relationships" xmlns:p="http://schemas.openxmlformats.org/presentationml/2006/main">
   <p:cSld>
     <p:spTree>
@@ -15690,23 +16042,7 @@
                   </a:outerShdw>
                 </a:effectLst>
               </a:rPr>
-              <a:t>Authentication </a:t>
-            </a:r>
-            <a:r>
-              <a:rPr lang="en-US" sz="2000" i="1" dirty="0" smtClean="0">
-                <a:ln w="0"/>
-                <a:solidFill>
-                  <a:schemeClr val="accent1"/>
-                </a:solidFill>
-                <a:effectLst>
-                  <a:outerShdw blurRad="38100" dist="25400" dir="5400000" algn="ctr" rotWithShape="0">
-                    <a:srgbClr val="6E747A">
-                      <a:alpha val="43000"/>
-                    </a:srgbClr>
-                  </a:outerShdw>
-                </a:effectLst>
-              </a:rPr>
-              <a:t>Continues… </a:t>
+              <a:t>Authentication Continues… </a:t>
             </a:r>
             <a:endParaRPr lang="en-US" sz="2000" i="1" dirty="0">
               <a:ln w="0"/>
@@ -15740,7 +16076,7 @@
           <a:lstStyle/>
           <a:p>
             <a:r>
-              <a:rPr lang="en-US" smtClean="0"/>
+              <a:rPr lang="en-US" dirty="0" smtClean="0"/>
               <a:t>PUBLIC</a:t>
             </a:r>
             <a:endParaRPr lang="en-US" dirty="0"/>
@@ -15833,7 +16169,7 @@
 </p:sld>
 </file>
 
-<file path=ppt/slides/slide27.xml><?xml version="1.0" encoding="utf-8"?>
+<file path=ppt/slides/slide28.xml><?xml version="1.0" encoding="utf-8"?>
 <p:sld xmlns:a="http://schemas.openxmlformats.org/drawingml/2006/main" xmlns:r="http://schemas.openxmlformats.org/officeDocument/2006/relationships" xmlns:p="http://schemas.openxmlformats.org/presentationml/2006/main">
   <p:cSld>
     <p:spTree>
@@ -15916,7 +16252,23 @@
                   </a:outerShdw>
                 </a:effectLst>
               </a:rPr>
-              <a:t>   </a:t>
+              <a:t>   GitHub </a:t>
+            </a:r>
+            <a:r>
+              <a:rPr lang="en-US" sz="2000" i="1" dirty="0">
+                <a:ln w="0"/>
+                <a:solidFill>
+                  <a:schemeClr val="accent1"/>
+                </a:solidFill>
+                <a:effectLst>
+                  <a:outerShdw blurRad="38100" dist="25400" dir="5400000" algn="ctr" rotWithShape="0">
+                    <a:srgbClr val="6E747A">
+                      <a:alpha val="43000"/>
+                    </a:srgbClr>
+                  </a:outerShdw>
+                </a:effectLst>
+              </a:rPr>
+              <a:t>Desktop </a:t>
             </a:r>
             <a:r>
               <a:rPr lang="en-US" sz="2000" i="1" dirty="0" smtClean="0">
@@ -15932,55 +16284,7 @@
                   </a:outerShdw>
                 </a:effectLst>
               </a:rPr>
-              <a:t>GitHub </a:t>
-            </a:r>
-            <a:r>
-              <a:rPr lang="en-US" sz="2000" i="1" dirty="0">
-                <a:ln w="0"/>
-                <a:solidFill>
-                  <a:schemeClr val="accent1"/>
-                </a:solidFill>
-                <a:effectLst>
-                  <a:outerShdw blurRad="38100" dist="25400" dir="5400000" algn="ctr" rotWithShape="0">
-                    <a:srgbClr val="6E747A">
-                      <a:alpha val="43000"/>
-                    </a:srgbClr>
-                  </a:outerShdw>
-                </a:effectLst>
-              </a:rPr>
-              <a:t>Desktop </a:t>
-            </a:r>
-            <a:r>
-              <a:rPr lang="en-US" sz="2000" i="1" dirty="0" smtClean="0">
-                <a:ln w="0"/>
-                <a:solidFill>
-                  <a:schemeClr val="accent1"/>
-                </a:solidFill>
-                <a:effectLst>
-                  <a:outerShdw blurRad="38100" dist="25400" dir="5400000" algn="ctr" rotWithShape="0">
-                    <a:srgbClr val="6E747A">
-                      <a:alpha val="43000"/>
-                    </a:srgbClr>
-                  </a:outerShdw>
-                </a:effectLst>
-              </a:rPr>
-              <a:t>Authentication  </a:t>
-            </a:r>
-            <a:r>
-              <a:rPr lang="en-US" sz="2000" i="1" dirty="0" smtClean="0">
-                <a:ln w="0"/>
-                <a:solidFill>
-                  <a:schemeClr val="accent1"/>
-                </a:solidFill>
-                <a:effectLst>
-                  <a:outerShdw blurRad="38100" dist="25400" dir="5400000" algn="ctr" rotWithShape="0">
-                    <a:srgbClr val="6E747A">
-                      <a:alpha val="43000"/>
-                    </a:srgbClr>
-                  </a:outerShdw>
-                </a:effectLst>
-              </a:rPr>
-              <a:t>Continues… </a:t>
+              <a:t>Authentication  Continues… </a:t>
             </a:r>
             <a:endParaRPr lang="en-US" sz="2000" i="1" dirty="0">
               <a:ln w="0"/>
@@ -16308,11 +16612,7 @@
             </a:pPr>
             <a:r>
               <a:rPr lang="en-US" dirty="0"/>
-              <a:t>Authenticating </a:t>
-            </a:r>
-            <a:r>
-              <a:rPr lang="en-US" dirty="0"/>
-              <a:t>to GitHub Enterprise with web flow:</a:t>
+              <a:t>Authenticating to GitHub Enterprise with web flow:</a:t>
             </a:r>
           </a:p>
           <a:p>
@@ -16417,13 +16717,7 @@
               <a:rPr lang="en-US" sz="1400" i="1" dirty="0">
                 <a:latin typeface="+mj-lt"/>
               </a:rPr>
-              <a:t>In the URL field, enter the URL for your GitHub Enterprise installation. </a:t>
-            </a:r>
-            <a:r>
-              <a:rPr lang="en-US" sz="1400" i="1" dirty="0">
-                <a:latin typeface="+mj-lt"/>
-              </a:rPr>
-              <a:t>.</a:t>
+              <a:t>In the URL field, enter the URL for your GitHub Enterprise installation. .</a:t>
             </a:r>
           </a:p>
           <a:p>
@@ -16468,7 +16762,7 @@
           <a:lstStyle/>
           <a:p>
             <a:r>
-              <a:rPr lang="en-US" smtClean="0"/>
+              <a:rPr lang="en-US" dirty="0" smtClean="0"/>
               <a:t>PUBLIC</a:t>
             </a:r>
             <a:endParaRPr lang="en-US" dirty="0"/>
@@ -16539,7 +16833,7 @@
 </p:sld>
 </file>
 
-<file path=ppt/slides/slide28.xml><?xml version="1.0" encoding="utf-8"?>
+<file path=ppt/slides/slide29.xml><?xml version="1.0" encoding="utf-8"?>
 <p:sld xmlns:a="http://schemas.openxmlformats.org/drawingml/2006/main" xmlns:r="http://schemas.openxmlformats.org/officeDocument/2006/relationships" xmlns:p="http://schemas.openxmlformats.org/presentationml/2006/main">
   <p:cSld>
     <p:spTree>
@@ -16572,7 +16866,7 @@
           <a:lstStyle/>
           <a:p>
             <a:r>
-              <a:rPr lang="en-US" smtClean="0"/>
+              <a:rPr lang="en-US" dirty="0" smtClean="0"/>
               <a:t>PUBLIC</a:t>
             </a:r>
             <a:endParaRPr lang="en-US" dirty="0"/>
@@ -16645,23 +16939,7 @@
                   </a:outerShdw>
                 </a:effectLst>
               </a:rPr>
-              <a:t>   </a:t>
-            </a:r>
-            <a:r>
-              <a:rPr lang="en-US" sz="2000" i="1" dirty="0" smtClean="0">
-                <a:ln w="0"/>
-                <a:solidFill>
-                  <a:schemeClr val="accent1"/>
-                </a:solidFill>
-                <a:effectLst>
-                  <a:outerShdw blurRad="38100" dist="25400" dir="5400000" algn="ctr" rotWithShape="0">
-                    <a:srgbClr val="6E747A">
-                      <a:alpha val="43000"/>
-                    </a:srgbClr>
-                  </a:outerShdw>
-                </a:effectLst>
-              </a:rPr>
-              <a:t>GitHub Desktop Security Continues… </a:t>
+              <a:t>   GitHub Desktop Security Continues… </a:t>
             </a:r>
             <a:endParaRPr lang="en-US" sz="2000" i="1" dirty="0">
               <a:ln w="0"/>
@@ -16696,59 +16974,6 @@
       </p:par>
     </p:tnLst>
   </p:timing>
-</p:sld>
-</file>
-
-<file path=ppt/slides/slide29.xml><?xml version="1.0" encoding="utf-8"?>
-<p:sld xmlns:a="http://schemas.openxmlformats.org/drawingml/2006/main" xmlns:r="http://schemas.openxmlformats.org/officeDocument/2006/relationships" xmlns:p="http://schemas.openxmlformats.org/presentationml/2006/main">
-  <p:cSld>
-    <p:spTree>
-      <p:nvGrpSpPr>
-        <p:cNvPr id="1" name=""/>
-        <p:cNvGrpSpPr/>
-        <p:nvPr/>
-      </p:nvGrpSpPr>
-      <p:grpSpPr>
-        <a:xfrm>
-          <a:off x="0" y="0"/>
-          <a:ext cx="0" cy="0"/>
-          <a:chOff x="0" y="0"/>
-          <a:chExt cx="0" cy="0"/>
-        </a:xfrm>
-      </p:grpSpPr>
-      <p:sp>
-        <p:nvSpPr>
-          <p:cNvPr id="2" name="Footer Placeholder 1"/>
-          <p:cNvSpPr>
-            <a:spLocks noGrp="1"/>
-          </p:cNvSpPr>
-          <p:nvPr>
-            <p:ph type="ftr" sz="quarter" idx="11"/>
-          </p:nvPr>
-        </p:nvSpPr>
-        <p:spPr/>
-        <p:txBody>
-          <a:bodyPr/>
-          <a:lstStyle/>
-          <a:p>
-            <a:r>
-              <a:rPr lang="en-US" smtClean="0"/>
-              <a:t>PUBLIC</a:t>
-            </a:r>
-            <a:endParaRPr lang="en-US" dirty="0"/>
-          </a:p>
-        </p:txBody>
-      </p:sp>
-    </p:spTree>
-    <p:extLst>
-      <p:ext uri="{BB962C8B-B14F-4D97-AF65-F5344CB8AC3E}">
-        <p14:creationId xmlns:p14="http://schemas.microsoft.com/office/powerpoint/2010/main" val="664253361"/>
-      </p:ext>
-    </p:extLst>
-  </p:cSld>
-  <p:clrMapOvr>
-    <a:masterClrMapping/>
-  </p:clrMapOvr>
 </p:sld>
 </file>
 
@@ -16834,17 +17059,7 @@
                   </a:schemeClr>
                 </a:solidFill>
               </a:rPr>
-              <a:t>Version Control System and </a:t>
-            </a:r>
-            <a:r>
-              <a:rPr lang="en-US" sz="4800" i="1" dirty="0" smtClean="0">
-                <a:solidFill>
-                  <a:schemeClr val="accent1">
-                    <a:lumMod val="75000"/>
-                  </a:schemeClr>
-                </a:solidFill>
-              </a:rPr>
-              <a:t>Understanding Git </a:t>
+              <a:t>Version Control System and Understanding Git </a:t>
             </a:r>
             <a:endParaRPr lang="en-US" sz="4800" i="1" dirty="0">
               <a:solidFill>
@@ -17325,6 +17540,59 @@
       </p:grpSpPr>
       <p:sp>
         <p:nvSpPr>
+          <p:cNvPr id="2" name="Footer Placeholder 1"/>
+          <p:cNvSpPr>
+            <a:spLocks noGrp="1"/>
+          </p:cNvSpPr>
+          <p:nvPr>
+            <p:ph type="ftr" sz="quarter" idx="11"/>
+          </p:nvPr>
+        </p:nvSpPr>
+        <p:spPr/>
+        <p:txBody>
+          <a:bodyPr/>
+          <a:lstStyle/>
+          <a:p>
+            <a:r>
+              <a:rPr lang="en-US" dirty="0" smtClean="0"/>
+              <a:t>PUBLIC</a:t>
+            </a:r>
+            <a:endParaRPr lang="en-US" dirty="0"/>
+          </a:p>
+        </p:txBody>
+      </p:sp>
+    </p:spTree>
+    <p:extLst>
+      <p:ext uri="{BB962C8B-B14F-4D97-AF65-F5344CB8AC3E}">
+        <p14:creationId xmlns:p14="http://schemas.microsoft.com/office/powerpoint/2010/main" val="664253361"/>
+      </p:ext>
+    </p:extLst>
+  </p:cSld>
+  <p:clrMapOvr>
+    <a:masterClrMapping/>
+  </p:clrMapOvr>
+</p:sld>
+</file>
+
+<file path=ppt/slides/slide31.xml><?xml version="1.0" encoding="utf-8"?>
+<p:sld xmlns:a="http://schemas.openxmlformats.org/drawingml/2006/main" xmlns:r="http://schemas.openxmlformats.org/officeDocument/2006/relationships" xmlns:p="http://schemas.openxmlformats.org/presentationml/2006/main">
+  <p:cSld>
+    <p:spTree>
+      <p:nvGrpSpPr>
+        <p:cNvPr id="1" name=""/>
+        <p:cNvGrpSpPr/>
+        <p:nvPr/>
+      </p:nvGrpSpPr>
+      <p:grpSpPr>
+        <a:xfrm>
+          <a:off x="0" y="0"/>
+          <a:ext cx="0" cy="0"/>
+          <a:chOff x="0" y="0"/>
+          <a:chExt cx="0" cy="0"/>
+        </a:xfrm>
+      </p:grpSpPr>
+      <p:sp>
+        <p:nvSpPr>
           <p:cNvPr id="3" name="Rectangle 2"/>
           <p:cNvSpPr/>
           <p:nvPr/>
@@ -17332,7 +17600,7 @@
         <p:spPr>
           <a:xfrm>
             <a:off x="499621" y="949219"/>
-            <a:ext cx="9662474" cy="6299160"/>
+            <a:ext cx="9662474" cy="4585871"/>
           </a:xfrm>
           <a:prstGeom prst="rect">
             <a:avLst/>
@@ -17856,84 +18124,25 @@
               <a:buFont typeface="Wingdings" panose="05000000000000000000" pitchFamily="2" charset="2"/>
               <a:buChar char="v"/>
             </a:pPr>
+            <a:r>
+              <a:rPr lang="en-US" sz="1200" dirty="0">
+                <a:latin typeface="Calibri" panose="020F0502020204030204" pitchFamily="34" charset="0"/>
+                <a:ea typeface="Calibri" panose="020F0502020204030204" pitchFamily="34" charset="0"/>
+                <a:cs typeface="Calibri" panose="020F0502020204030204" pitchFamily="34" charset="0"/>
+                <a:hlinkClick r:id="rId17"/>
+              </a:rPr>
+              <a:t>https://www.atlassian.com/git/tutorials/comparing-workflows</a:t>
+            </a:r>
+            <a:r>
+              <a:rPr lang="en-US" sz="1200" dirty="0" smtClean="0">
+                <a:latin typeface="Calibri" panose="020F0502020204030204" pitchFamily="34" charset="0"/>
+                <a:ea typeface="Calibri" panose="020F0502020204030204" pitchFamily="34" charset="0"/>
+                <a:cs typeface="Calibri" panose="020F0502020204030204" pitchFamily="34" charset="0"/>
+                <a:hlinkClick r:id="rId17"/>
+              </a:rPr>
+              <a:t>/</a:t>
+            </a:r>
             <a:endParaRPr lang="en-US" sz="1200" dirty="0" smtClean="0">
-              <a:latin typeface="Calibri" panose="020F0502020204030204" pitchFamily="34" charset="0"/>
-              <a:ea typeface="Calibri" panose="020F0502020204030204" pitchFamily="34" charset="0"/>
-              <a:cs typeface="Calibri" panose="020F0502020204030204" pitchFamily="34" charset="0"/>
-            </a:endParaRPr>
-          </a:p>
-          <a:p>
-            <a:pPr marL="285750" indent="-285750" algn="just">
-              <a:spcAft>
-                <a:spcPts val="800"/>
-              </a:spcAft>
-              <a:buFont typeface="Wingdings" panose="05000000000000000000" pitchFamily="2" charset="2"/>
-              <a:buChar char="v"/>
-            </a:pPr>
-            <a:endParaRPr lang="en-US" sz="1200" dirty="0" smtClean="0">
-              <a:latin typeface="Calibri" panose="020F0502020204030204" pitchFamily="34" charset="0"/>
-              <a:ea typeface="Calibri" panose="020F0502020204030204" pitchFamily="34" charset="0"/>
-              <a:cs typeface="Calibri" panose="020F0502020204030204" pitchFamily="34" charset="0"/>
-            </a:endParaRPr>
-          </a:p>
-          <a:p>
-            <a:pPr marL="285750" indent="-285750" algn="just">
-              <a:spcAft>
-                <a:spcPts val="800"/>
-              </a:spcAft>
-              <a:buFont typeface="Wingdings" panose="05000000000000000000" pitchFamily="2" charset="2"/>
-              <a:buChar char="v"/>
-            </a:pPr>
-            <a:endParaRPr lang="en-US" sz="1200" dirty="0" smtClean="0">
-              <a:latin typeface="Calibri" panose="020F0502020204030204" pitchFamily="34" charset="0"/>
-              <a:ea typeface="Calibri" panose="020F0502020204030204" pitchFamily="34" charset="0"/>
-              <a:cs typeface="Calibri" panose="020F0502020204030204" pitchFamily="34" charset="0"/>
-            </a:endParaRPr>
-          </a:p>
-          <a:p>
-            <a:pPr marL="285750" indent="-285750" algn="just">
-              <a:spcAft>
-                <a:spcPts val="800"/>
-              </a:spcAft>
-              <a:buFont typeface="Wingdings" panose="05000000000000000000" pitchFamily="2" charset="2"/>
-              <a:buChar char="v"/>
-            </a:pPr>
-            <a:endParaRPr lang="en-US" sz="1200" dirty="0" smtClean="0">
-              <a:latin typeface="Calibri" panose="020F0502020204030204" pitchFamily="34" charset="0"/>
-              <a:ea typeface="Calibri" panose="020F0502020204030204" pitchFamily="34" charset="0"/>
-              <a:cs typeface="Calibri" panose="020F0502020204030204" pitchFamily="34" charset="0"/>
-            </a:endParaRPr>
-          </a:p>
-          <a:p>
-            <a:pPr marL="285750" indent="-285750" algn="just">
-              <a:lnSpc>
-                <a:spcPct val="150000"/>
-              </a:lnSpc>
-              <a:spcAft>
-                <a:spcPts val="800"/>
-              </a:spcAft>
-              <a:buFont typeface="Wingdings" panose="05000000000000000000" pitchFamily="2" charset="2"/>
-              <a:buChar char="v"/>
-            </a:pPr>
-            <a:endParaRPr lang="en-US" sz="1400" dirty="0" smtClean="0">
-              <a:latin typeface="Calibri" panose="020F0502020204030204" pitchFamily="34" charset="0"/>
-              <a:ea typeface="Calibri" panose="020F0502020204030204" pitchFamily="34" charset="0"/>
-              <a:cs typeface="Calibri" panose="020F0502020204030204" pitchFamily="34" charset="0"/>
-            </a:endParaRPr>
-          </a:p>
-          <a:p>
-            <a:pPr marL="285750" indent="-285750" algn="just">
-              <a:lnSpc>
-                <a:spcPct val="150000"/>
-              </a:lnSpc>
-              <a:spcAft>
-                <a:spcPts val="800"/>
-              </a:spcAft>
-              <a:buFont typeface="Wingdings" panose="05000000000000000000" pitchFamily="2" charset="2"/>
-              <a:buChar char="v"/>
-            </a:pPr>
-            <a:endParaRPr lang="en-US" sz="1400" dirty="0">
-              <a:effectLst/>
               <a:latin typeface="Calibri" panose="020F0502020204030204" pitchFamily="34" charset="0"/>
               <a:ea typeface="Calibri" panose="020F0502020204030204" pitchFamily="34" charset="0"/>
               <a:cs typeface="Calibri" panose="020F0502020204030204" pitchFamily="34" charset="0"/>
@@ -18065,7 +18274,7 @@
           <a:p>
             <a:fld id="{5353F4A8-CFD9-4FA7-984D-3FBCE02D5382}" type="slidenum">
               <a:rPr lang="en-US" smtClean="0"/>
-              <a:t>30</a:t>
+              <a:t>31</a:t>
             </a:fld>
             <a:endParaRPr lang="en-US" dirty="0"/>
           </a:p>
@@ -19310,23 +19519,7 @@
                   </a:outerShdw>
                 </a:effectLst>
               </a:rPr>
-              <a:t>    What is </a:t>
-            </a:r>
-            <a:r>
-              <a:rPr lang="en-US" sz="2000" i="1" dirty="0" smtClean="0">
-                <a:ln w="0"/>
-                <a:solidFill>
-                  <a:schemeClr val="accent1"/>
-                </a:solidFill>
-                <a:effectLst>
-                  <a:outerShdw blurRad="38100" dist="25400" dir="5400000" algn="ctr" rotWithShape="0">
-                    <a:srgbClr val="6E747A">
-                      <a:alpha val="43000"/>
-                    </a:srgbClr>
-                  </a:outerShdw>
-                </a:effectLst>
-              </a:rPr>
-              <a:t>Git ?</a:t>
+              <a:t>    What is Git ?</a:t>
             </a:r>
             <a:endParaRPr lang="en-US" sz="2000" i="1" dirty="0">
               <a:ln w="0"/>
@@ -19383,7 +19576,7 @@
         <p:spPr>
           <a:xfrm>
             <a:off x="547435" y="698133"/>
-            <a:ext cx="11244813" cy="5937523"/>
+            <a:ext cx="11244813" cy="5155257"/>
           </a:xfrm>
           <a:prstGeom prst="rect">
             <a:avLst/>
@@ -19406,19 +19599,19 @@
               <a:buChar char="v"/>
             </a:pPr>
             <a:r>
-              <a:rPr lang="en-US" sz="1100" b="1" i="1" dirty="0">
+              <a:rPr lang="en-US" sz="1200" b="1" i="1" dirty="0">
                 <a:latin typeface="+mj-lt"/>
               </a:rPr>
               <a:t>Git</a:t>
             </a:r>
             <a:r>
-              <a:rPr lang="en-US" sz="1100" i="1" dirty="0">
+              <a:rPr lang="en-US" sz="1200" i="1" dirty="0">
                 <a:latin typeface="+mj-lt"/>
               </a:rPr>
               <a:t> is an open-source version control system that was started by Linus Trovalds – the same person who created </a:t>
             </a:r>
             <a:r>
-              <a:rPr lang="en-US" sz="1100" i="1" dirty="0" smtClean="0">
+              <a:rPr lang="en-US" sz="1200" i="1" dirty="0" smtClean="0">
                 <a:latin typeface="+mj-lt"/>
               </a:rPr>
               <a:t>Linux.</a:t>
@@ -19436,16 +19629,16 @@
               <a:buChar char="v"/>
             </a:pPr>
             <a:r>
-              <a:rPr lang="en-US" sz="1100" i="1" dirty="0" smtClean="0">
+              <a:rPr lang="en-US" sz="1200" i="1" dirty="0" smtClean="0">
                 <a:latin typeface="+mj-lt"/>
               </a:rPr>
               <a:t>Git </a:t>
             </a:r>
             <a:r>
-              <a:rPr lang="en-US" sz="1100" i="1" dirty="0">
-                <a:latin typeface="+mj-lt"/>
-              </a:rPr>
-              <a:t>is a mature, actively maintained open source project originally developed in 2005 by Linus Torvalds.</a:t>
+              <a:rPr lang="en-US" sz="1200" i="1" dirty="0">
+                <a:latin typeface="+mj-lt"/>
+              </a:rPr>
+              <a:t>is an example of a DVCS (Distributed Version Control System). Rather than have only one single place for the full version history, in Git, every developer's working copy of the code is also a repository that can contain the full history of all changes.</a:t>
             </a:r>
           </a:p>
           <a:p>
@@ -19460,10 +19653,16 @@
               <a:buChar char="v"/>
             </a:pPr>
             <a:r>
-              <a:rPr lang="en-US" sz="1100" i="1" dirty="0">
-                <a:latin typeface="+mj-lt"/>
-              </a:rPr>
-              <a:t>Git is an example of a DVCS (Distributed Version Control System). Rather than have only one single place for the full version history, in Git, every developer's working copy of the code is also a repository that can contain the full history of all changes.</a:t>
+              <a:rPr lang="en-US" sz="1200" i="1" dirty="0">
+                <a:latin typeface="+mj-lt"/>
+              </a:rPr>
+              <a:t>In addition to being distributed, Git has been designed with performance, security and flexibility in mind</a:t>
+            </a:r>
+            <a:r>
+              <a:rPr lang="en-US" sz="1200" i="1" dirty="0" smtClean="0">
+                <a:latin typeface="+mj-lt"/>
+              </a:rPr>
+              <a:t>.</a:t>
             </a:r>
           </a:p>
           <a:p>
@@ -19478,17 +19677,20 @@
               <a:buChar char="v"/>
             </a:pPr>
             <a:r>
-              <a:rPr lang="en-US" sz="1100" i="1" dirty="0">
-                <a:latin typeface="+mj-lt"/>
-              </a:rPr>
-              <a:t>In addition to being distributed, Git has been designed with performance, security and flexibility in mind</a:t>
-            </a:r>
-            <a:r>
-              <a:rPr lang="en-US" sz="1100" i="1" dirty="0" smtClean="0">
-                <a:latin typeface="+mj-lt"/>
-              </a:rPr>
-              <a:t>.</a:t>
-            </a:r>
+              <a:rPr lang="en-US" sz="1200" i="1" dirty="0">
+                <a:latin typeface="+mj-lt"/>
+              </a:rPr>
+              <a:t>Git uses a common cryptographic hash function called secure hash function (SHA1</a:t>
+            </a:r>
+            <a:r>
+              <a:rPr lang="en-US" sz="1200" i="1" dirty="0" smtClean="0">
+                <a:latin typeface="+mj-lt"/>
+              </a:rPr>
+              <a:t>) to store the data in to Git Database.</a:t>
+            </a:r>
+            <a:endParaRPr lang="en-US" sz="1200" i="1" dirty="0">
+              <a:latin typeface="+mj-lt"/>
+            </a:endParaRPr>
           </a:p>
           <a:p>
             <a:pPr marL="171450" indent="-171450" algn="just">
@@ -19502,20 +19704,17 @@
               <a:buChar char="v"/>
             </a:pPr>
             <a:r>
-              <a:rPr lang="en-US" sz="1100" i="1" dirty="0">
-                <a:latin typeface="+mj-lt"/>
-              </a:rPr>
-              <a:t>Git uses a common cryptographic hash function called secure hash function (SHA1</a:t>
-            </a:r>
-            <a:r>
-              <a:rPr lang="en-US" sz="1100" i="1" dirty="0" smtClean="0">
-                <a:latin typeface="+mj-lt"/>
-              </a:rPr>
-              <a:t>) to store the data in to Git Database.</a:t>
-            </a:r>
-            <a:endParaRPr lang="en-US" sz="1100" i="1" dirty="0">
-              <a:latin typeface="+mj-lt"/>
-            </a:endParaRPr>
+              <a:rPr lang="en-US" sz="1200" i="1" dirty="0">
+                <a:latin typeface="+mj-lt"/>
+              </a:rPr>
+              <a:t>Having a full local history makes Git fast, you don’t need a network connection to create commits, inspect previous versions of a file, or perform diffs between commits</a:t>
+            </a:r>
+            <a:r>
+              <a:rPr lang="en-US" sz="1200" i="1" dirty="0" smtClean="0">
+                <a:latin typeface="+mj-lt"/>
+              </a:rPr>
+              <a:t>.</a:t>
+            </a:r>
           </a:p>
           <a:p>
             <a:pPr marL="171450" indent="-171450" algn="just">
@@ -19529,16 +19728,22 @@
               <a:buChar char="v"/>
             </a:pPr>
             <a:r>
-              <a:rPr lang="en-US" sz="1100" i="1" dirty="0">
-                <a:latin typeface="+mj-lt"/>
-              </a:rPr>
-              <a:t>Having a full local history makes Git fast, you don’t need a network connection to create commits, inspect previous versions of a file, or perform diffs between commits</a:t>
-            </a:r>
-            <a:r>
-              <a:rPr lang="en-US" sz="1100" i="1" dirty="0" smtClean="0">
-                <a:latin typeface="+mj-lt"/>
-              </a:rPr>
-              <a:t>.</a:t>
+              <a:rPr lang="en-US" sz="1200" i="1" dirty="0" smtClean="0">
+                <a:latin typeface="+mj-lt"/>
+              </a:rPr>
+              <a:t>Git use </a:t>
+            </a:r>
+            <a:r>
+              <a:rPr lang="en-US" sz="1200" b="1" i="1" dirty="0" smtClean="0">
+                <a:latin typeface="+mj-lt"/>
+              </a:rPr>
+              <a:t>blob, tree, commit and tag </a:t>
+            </a:r>
+            <a:r>
+              <a:rPr lang="en-US" sz="1200" i="1" dirty="0" smtClean="0">
+                <a:latin typeface="+mj-lt"/>
+              </a:rPr>
+              <a:t>objects to store the details  of data.</a:t>
             </a:r>
           </a:p>
           <a:p>
@@ -19553,22 +19758,35 @@
               <a:buChar char="v"/>
             </a:pPr>
             <a:r>
-              <a:rPr lang="en-US" sz="1100" i="1" dirty="0" smtClean="0">
-                <a:latin typeface="+mj-lt"/>
-              </a:rPr>
-              <a:t>Git use </a:t>
-            </a:r>
-            <a:r>
-              <a:rPr lang="en-US" sz="1100" b="1" i="1" dirty="0" smtClean="0">
-                <a:latin typeface="+mj-lt"/>
-              </a:rPr>
-              <a:t>blob, tree, commit and tag </a:t>
-            </a:r>
-            <a:r>
-              <a:rPr lang="en-US" sz="1100" i="1" dirty="0" smtClean="0">
-                <a:latin typeface="+mj-lt"/>
-              </a:rPr>
-              <a:t>objects to store the details  of data.</a:t>
+              <a:rPr lang="en-US" sz="1200" i="1" dirty="0" smtClean="0">
+                <a:latin typeface="+mj-lt"/>
+              </a:rPr>
+              <a:t>Default Git configuration file  location is .git/config.</a:t>
+            </a:r>
+            <a:endParaRPr lang="en-US" sz="1200" i="1" dirty="0">
+              <a:latin typeface="+mj-lt"/>
+            </a:endParaRPr>
+          </a:p>
+          <a:p>
+            <a:pPr>
+              <a:lnSpc>
+                <a:spcPct val="200000"/>
+              </a:lnSpc>
+              <a:spcAft>
+                <a:spcPts val="800"/>
+              </a:spcAft>
+            </a:pPr>
+            <a:r>
+              <a:rPr lang="en-US" sz="1200" b="1" i="1" dirty="0">
+                <a:latin typeface="+mj-lt"/>
+              </a:rPr>
+              <a:t>Advantages of </a:t>
+            </a:r>
+            <a:r>
+              <a:rPr lang="en-US" sz="1200" b="1" i="1" dirty="0" smtClean="0">
+                <a:latin typeface="+mj-lt"/>
+              </a:rPr>
+              <a:t>Git:</a:t>
             </a:r>
           </a:p>
           <a:p>
@@ -19583,35 +19801,17 @@
               <a:buChar char="v"/>
             </a:pPr>
             <a:r>
-              <a:rPr lang="en-US" sz="1100" i="1" dirty="0" smtClean="0">
-                <a:latin typeface="+mj-lt"/>
-              </a:rPr>
-              <a:t>Default Git configuration file  location is .git/config.</a:t>
-            </a:r>
-            <a:endParaRPr lang="en-US" sz="1100" i="1" dirty="0">
-              <a:latin typeface="+mj-lt"/>
-            </a:endParaRPr>
-          </a:p>
-          <a:p>
-            <a:pPr>
+              <a:rPr lang="fi-FI" sz="1200" i="1" dirty="0">
+                <a:latin typeface="+mj-lt"/>
+              </a:rPr>
+              <a:t>Changing branches can be done offline</a:t>
+            </a:r>
+          </a:p>
+          <a:p>
+            <a:pPr marL="171450" indent="-171450" algn="just">
               <a:lnSpc>
-                <a:spcPct val="200000"/>
+                <a:spcPct val="150000"/>
               </a:lnSpc>
-              <a:spcAft>
-                <a:spcPts val="800"/>
-              </a:spcAft>
-            </a:pPr>
-            <a:r>
-              <a:rPr lang="en-US" sz="1400" b="1" i="1" dirty="0"/>
-              <a:t>Advantages of </a:t>
-            </a:r>
-            <a:r>
-              <a:rPr lang="en-US" sz="1400" b="1" i="1" dirty="0" smtClean="0"/>
-              <a:t>Git:</a:t>
-            </a:r>
-          </a:p>
-          <a:p>
-            <a:pPr marL="171450" indent="-171450" algn="just">
               <a:spcAft>
                 <a:spcPts val="800"/>
               </a:spcAft>
@@ -19619,26 +19819,17 @@
               <a:buChar char="v"/>
             </a:pPr>
             <a:r>
-              <a:rPr lang="en-US" sz="1100" b="1" i="1" dirty="0">
-                <a:latin typeface="+mj-lt"/>
-              </a:rPr>
-              <a:t>Free and open </a:t>
-            </a:r>
-            <a:r>
-              <a:rPr lang="en-US" sz="1100" b="1" i="1" dirty="0" smtClean="0">
-                <a:latin typeface="+mj-lt"/>
-              </a:rPr>
-              <a:t>source : </a:t>
-            </a:r>
-            <a:r>
-              <a:rPr lang="en-US" sz="1100" i="1" dirty="0">
-                <a:latin typeface="+mj-lt"/>
-              </a:rPr>
-              <a:t>You can use Git to manage propriety projects without paying a single penny. As it is an open source, you can download its source code and also perform changes according to your requirements.</a:t>
+              <a:rPr lang="fi-FI" sz="1200" i="1" dirty="0">
+                <a:latin typeface="+mj-lt"/>
+              </a:rPr>
+              <a:t>Other revisions of a file can be obtained</a:t>
             </a:r>
           </a:p>
           <a:p>
             <a:pPr marL="171450" indent="-171450" algn="just">
+              <a:lnSpc>
+                <a:spcPct val="150000"/>
+              </a:lnSpc>
               <a:spcAft>
                 <a:spcPts val="800"/>
               </a:spcAft>
@@ -19646,20 +19837,17 @@
               <a:buChar char="v"/>
             </a:pPr>
             <a:r>
-              <a:rPr lang="en-US" sz="1100" b="1" i="1" dirty="0">
-                <a:latin typeface="+mj-lt"/>
-              </a:rPr>
-              <a:t>Fast and small </a:t>
-            </a:r>
-            <a:r>
-              <a:rPr lang="en-US" sz="1100" i="1" dirty="0">
-                <a:latin typeface="+mj-lt"/>
-              </a:rPr>
-              <a:t>: The core part of Git is written in C, which avoids runtime overheads associated with other high-level languages. Though Git mirrors entire repository, the size of the data on the client side is small. This illustrates the efficiency of Git at compressing and storing data on the client side.</a:t>
+              <a:rPr lang="fi-FI" sz="1200" i="1" dirty="0">
+                <a:latin typeface="+mj-lt"/>
+              </a:rPr>
+              <a:t>Changes can be commited offline</a:t>
             </a:r>
           </a:p>
           <a:p>
             <a:pPr marL="171450" indent="-171450" algn="just">
+              <a:lnSpc>
+                <a:spcPct val="150000"/>
+              </a:lnSpc>
               <a:spcAft>
                 <a:spcPts val="800"/>
               </a:spcAft>
@@ -19667,110 +19855,18 @@
               <a:buChar char="v"/>
             </a:pPr>
             <a:r>
-              <a:rPr lang="en-US" sz="1100" b="1" i="1" dirty="0">
-                <a:latin typeface="+mj-lt"/>
-              </a:rPr>
-              <a:t>Implicit backup </a:t>
-            </a:r>
-            <a:r>
-              <a:rPr lang="en-US" sz="1100" i="1" dirty="0">
-                <a:latin typeface="+mj-lt"/>
-              </a:rPr>
-              <a:t>: Data present on any client side mirrors the repository, hence it can be used in the event of a crash or disk </a:t>
-            </a:r>
-            <a:r>
-              <a:rPr lang="en-US" sz="1100" i="1" dirty="0" smtClean="0">
-                <a:latin typeface="+mj-lt"/>
-              </a:rPr>
-              <a:t>corruption.</a:t>
-            </a:r>
-          </a:p>
-          <a:p>
-            <a:pPr marL="171450" indent="-171450" algn="just">
+              <a:rPr lang="fi-FI" sz="1200" i="1" dirty="0">
+                <a:latin typeface="+mj-lt"/>
+              </a:rPr>
+              <a:t>Merging and Diff can be done offline</a:t>
+            </a:r>
+          </a:p>
+          <a:p>
+            <a:pPr algn="just">
               <a:spcAft>
                 <a:spcPts val="800"/>
               </a:spcAft>
-              <a:buFont typeface="Wingdings" panose="05000000000000000000" pitchFamily="2" charset="2"/>
-              <a:buChar char="v"/>
-            </a:pPr>
-            <a:r>
-              <a:rPr lang="en-US" sz="1100" b="1" i="1" dirty="0" smtClean="0">
-                <a:latin typeface="+mj-lt"/>
-              </a:rPr>
-              <a:t>Security </a:t>
-            </a:r>
-            <a:r>
-              <a:rPr lang="en-US" sz="1100" b="1" i="1" dirty="0">
-                <a:latin typeface="+mj-lt"/>
-              </a:rPr>
-              <a:t>: </a:t>
-            </a:r>
-            <a:r>
-              <a:rPr lang="en-US" sz="1100" i="1" dirty="0">
-                <a:latin typeface="+mj-lt"/>
-              </a:rPr>
-              <a:t>Git uses a common cryptographic hash function called secure hash function (SHA1), to name and identify objects within its database. it is impossible to change file, date, and commit message and any other data from the Git database without knowing Git</a:t>
-            </a:r>
-            <a:r>
-              <a:rPr lang="en-US" sz="1100" i="1" dirty="0" smtClean="0">
-                <a:latin typeface="+mj-lt"/>
-              </a:rPr>
-              <a:t>.</a:t>
-            </a:r>
-          </a:p>
-          <a:p>
-            <a:pPr marL="171450" indent="-171450" algn="just">
-              <a:spcAft>
-                <a:spcPts val="800"/>
-              </a:spcAft>
-              <a:buFont typeface="Wingdings" panose="05000000000000000000" pitchFamily="2" charset="2"/>
-              <a:buChar char="v"/>
-            </a:pPr>
-            <a:r>
-              <a:rPr lang="en-US" sz="1100" b="1" i="1" dirty="0">
-                <a:latin typeface="+mj-lt"/>
-              </a:rPr>
-              <a:t>No need of powerful hardware</a:t>
-            </a:r>
-            <a:r>
-              <a:rPr lang="en-US" sz="1100" i="1" dirty="0">
-                <a:latin typeface="+mj-lt"/>
-              </a:rPr>
-              <a:t>:   In GIT, developers don’t interact with the server unless they need to push or pull changes. All the heavy lifting happens on the client side, so the server hardware can be very simple indeed</a:t>
-            </a:r>
-            <a:r>
-              <a:rPr lang="en-US" sz="1100" i="1" dirty="0" smtClean="0">
-                <a:latin typeface="+mj-lt"/>
-              </a:rPr>
-              <a:t>.</a:t>
-            </a:r>
-          </a:p>
-          <a:p>
-            <a:pPr marL="171450" indent="-171450" algn="just">
-              <a:spcAft>
-                <a:spcPts val="800"/>
-              </a:spcAft>
-              <a:buFont typeface="Wingdings" panose="05000000000000000000" pitchFamily="2" charset="2"/>
-              <a:buChar char="v"/>
-            </a:pPr>
-            <a:r>
-              <a:rPr lang="en-US" sz="1100" b="1" i="1" dirty="0">
-                <a:latin typeface="+mj-lt"/>
-              </a:rPr>
-              <a:t>Easier branching </a:t>
-            </a:r>
-            <a:r>
-              <a:rPr lang="en-US" sz="1100" i="1" dirty="0">
-                <a:latin typeface="+mj-lt"/>
-              </a:rPr>
-              <a:t>: management with Git is very simple. It takes only a few seconds to create, delete, and merge branches</a:t>
-            </a:r>
-            <a:r>
-              <a:rPr lang="en-US" sz="1100" i="1" dirty="0" smtClean="0">
-                <a:latin typeface="+mj-lt"/>
-              </a:rPr>
-              <a:t>.</a:t>
-            </a:r>
+            </a:pPr>
             <a:endParaRPr lang="en-US" sz="1100" dirty="0">
               <a:effectLst/>
               <a:latin typeface="Calibri Light" panose="020F0302020204030204" pitchFamily="34" charset="0"/>

</xml_diff>